<commit_message>
Added welcome_v1.py as a component
Implemented welcome_v1.py as a function of pizzabot.py
</commit_message>
<xml_diff>
--- a/pizzapowerpoint.pptx
+++ b/pizzapowerpoint.pptx
@@ -5,7 +5,7 @@
     <p:sldMasterId id="2147483659" r:id="rId4"/>
   </p:sldMasterIdLst>
   <p:notesMasterIdLst>
-    <p:notesMasterId r:id="rId19"/>
+    <p:notesMasterId r:id="rId21"/>
   </p:notesMasterIdLst>
   <p:sldIdLst>
     <p:sldId id="256" r:id="rId5"/>
@@ -20,8 +20,10 @@
     <p:sldId id="266" r:id="rId14"/>
     <p:sldId id="268" r:id="rId15"/>
     <p:sldId id="269" r:id="rId16"/>
-    <p:sldId id="261" r:id="rId17"/>
-    <p:sldId id="262" r:id="rId18"/>
+    <p:sldId id="270" r:id="rId17"/>
+    <p:sldId id="271" r:id="rId18"/>
+    <p:sldId id="261" r:id="rId19"/>
+    <p:sldId id="262" r:id="rId20"/>
   </p:sldIdLst>
   <p:sldSz cx="9144000" cy="5143500" type="screen16x9"/>
   <p:notesSz cx="6858000" cy="9144000"/>
@@ -275,6 +277,8 @@
             <p14:sldId id="266"/>
             <p14:sldId id="268"/>
             <p14:sldId id="269"/>
+            <p14:sldId id="270"/>
+            <p14:sldId id="271"/>
           </p14:sldIdLst>
         </p14:section>
         <p14:section name="endbit" id="{C87F78D7-C127-418A-B7F3-358C78397AC6}">
@@ -308,12 +312,152 @@
   <p1510:revLst>
     <p1510:client id="{144C3C78-124B-466C-8FE1-23FD5A90EFF3}" v="4" dt="2023-05-17T09:43:57.921"/>
     <p1510:client id="{6E88F79A-04E8-2644-5D52-BBE8D04264AC}" v="8" dt="2023-05-17T09:17:16.146"/>
+    <p1510:client id="{DC01E7D0-ECC4-24C5-E5BE-DE2A9FB64150}" v="54" dt="2023-05-17T10:21:52.792"/>
   </p1510:revLst>
 </p1510:revInfo>
 </file>
 
 <file path=ppt/changesInfos/changesInfo1.xml><?xml version="1.0" encoding="utf-8"?>
 <pc:chgInfo xmlns:a="http://schemas.openxmlformats.org/drawingml/2006/main" xmlns:r="http://schemas.openxmlformats.org/officeDocument/2006/relationships" xmlns:ac="http://schemas.microsoft.com/office/drawing/2013/main/command" xmlns:pc="http://schemas.microsoft.com/office/powerpoint/2013/main/command">
+  <pc:docChgLst>
+    <pc:chgData name="Eardwulf Ulan" userId="S::18111@my.sanctamaria.school.nz::22607890-71d4-4bf2-b097-b426e6c19788" providerId="AD" clId="Web-{6E88F79A-04E8-2644-5D52-BBE8D04264AC}"/>
+    <pc:docChg chg="modSld">
+      <pc:chgData name="Eardwulf Ulan" userId="S::18111@my.sanctamaria.school.nz::22607890-71d4-4bf2-b097-b426e6c19788" providerId="AD" clId="Web-{6E88F79A-04E8-2644-5D52-BBE8D04264AC}" dt="2023-05-17T09:17:16.146" v="7"/>
+      <pc:docMkLst>
+        <pc:docMk/>
+      </pc:docMkLst>
+      <pc:sldChg chg="modSp">
+        <pc:chgData name="Eardwulf Ulan" userId="S::18111@my.sanctamaria.school.nz::22607890-71d4-4bf2-b097-b426e6c19788" providerId="AD" clId="Web-{6E88F79A-04E8-2644-5D52-BBE8D04264AC}" dt="2023-05-17T09:17:11.380" v="5" actId="20577"/>
+        <pc:sldMkLst>
+          <pc:docMk/>
+          <pc:sldMk cId="0" sldId="256"/>
+        </pc:sldMkLst>
+        <pc:spChg chg="mod">
+          <ac:chgData name="Eardwulf Ulan" userId="S::18111@my.sanctamaria.school.nz::22607890-71d4-4bf2-b097-b426e6c19788" providerId="AD" clId="Web-{6E88F79A-04E8-2644-5D52-BBE8D04264AC}" dt="2023-05-17T09:17:11.380" v="5" actId="20577"/>
+          <ac:spMkLst>
+            <pc:docMk/>
+            <pc:sldMk cId="0" sldId="256"/>
+            <ac:spMk id="55" creationId="{00000000-0000-0000-0000-000000000000}"/>
+          </ac:spMkLst>
+        </pc:spChg>
+      </pc:sldChg>
+      <pc:sldChg chg="delSp">
+        <pc:chgData name="Eardwulf Ulan" userId="S::18111@my.sanctamaria.school.nz::22607890-71d4-4bf2-b097-b426e6c19788" providerId="AD" clId="Web-{6E88F79A-04E8-2644-5D52-BBE8D04264AC}" dt="2023-05-17T09:17:16.146" v="7"/>
+        <pc:sldMkLst>
+          <pc:docMk/>
+          <pc:sldMk cId="0" sldId="258"/>
+        </pc:sldMkLst>
+        <pc:picChg chg="del">
+          <ac:chgData name="Eardwulf Ulan" userId="S::18111@my.sanctamaria.school.nz::22607890-71d4-4bf2-b097-b426e6c19788" providerId="AD" clId="Web-{6E88F79A-04E8-2644-5D52-BBE8D04264AC}" dt="2023-05-17T09:17:14.740" v="6"/>
+          <ac:picMkLst>
+            <pc:docMk/>
+            <pc:sldMk cId="0" sldId="258"/>
+            <ac:picMk id="7" creationId="{059FCAF7-42B9-EC33-23CC-D0AB65EA9094}"/>
+          </ac:picMkLst>
+        </pc:picChg>
+        <pc:picChg chg="del">
+          <ac:chgData name="Eardwulf Ulan" userId="S::18111@my.sanctamaria.school.nz::22607890-71d4-4bf2-b097-b426e6c19788" providerId="AD" clId="Web-{6E88F79A-04E8-2644-5D52-BBE8D04264AC}" dt="2023-05-17T09:17:16.146" v="7"/>
+          <ac:picMkLst>
+            <pc:docMk/>
+            <pc:sldMk cId="0" sldId="258"/>
+            <ac:picMk id="9" creationId="{8A267450-5119-A659-4930-551991672E7A}"/>
+          </ac:picMkLst>
+        </pc:picChg>
+      </pc:sldChg>
+    </pc:docChg>
+  </pc:docChgLst>
+  <pc:docChgLst>
+    <pc:chgData name="Eardwulf Ulan" userId="S::18111@my.sanctamaria.school.nz::22607890-71d4-4bf2-b097-b426e6c19788" providerId="AD" clId="Web-{DC01E7D0-ECC4-24C5-E5BE-DE2A9FB64150}"/>
+    <pc:docChg chg="addSld modSld sldOrd modSection">
+      <pc:chgData name="Eardwulf Ulan" userId="S::18111@my.sanctamaria.school.nz::22607890-71d4-4bf2-b097-b426e6c19788" providerId="AD" clId="Web-{DC01E7D0-ECC4-24C5-E5BE-DE2A9FB64150}" dt="2023-05-17T10:21:52.792" v="44" actId="20577"/>
+      <pc:docMkLst>
+        <pc:docMk/>
+      </pc:docMkLst>
+      <pc:sldChg chg="addSp modSp">
+        <pc:chgData name="Eardwulf Ulan" userId="S::18111@my.sanctamaria.school.nz::22607890-71d4-4bf2-b097-b426e6c19788" providerId="AD" clId="Web-{DC01E7D0-ECC4-24C5-E5BE-DE2A9FB64150}" dt="2023-05-17T10:19:41.320" v="42" actId="1076"/>
+        <pc:sldMkLst>
+          <pc:docMk/>
+          <pc:sldMk cId="3048879607" sldId="266"/>
+        </pc:sldMkLst>
+        <pc:graphicFrameChg chg="mod modGraphic">
+          <ac:chgData name="Eardwulf Ulan" userId="S::18111@my.sanctamaria.school.nz::22607890-71d4-4bf2-b097-b426e6c19788" providerId="AD" clId="Web-{DC01E7D0-ECC4-24C5-E5BE-DE2A9FB64150}" dt="2023-05-17T10:19:10.085" v="32"/>
+          <ac:graphicFrameMkLst>
+            <pc:docMk/>
+            <pc:sldMk cId="3048879607" sldId="266"/>
+            <ac:graphicFrameMk id="79" creationId="{00000000-0000-0000-0000-000000000000}"/>
+          </ac:graphicFrameMkLst>
+        </pc:graphicFrameChg>
+        <pc:picChg chg="add mod">
+          <ac:chgData name="Eardwulf Ulan" userId="S::18111@my.sanctamaria.school.nz::22607890-71d4-4bf2-b097-b426e6c19788" providerId="AD" clId="Web-{DC01E7D0-ECC4-24C5-E5BE-DE2A9FB64150}" dt="2023-05-17T10:19:41.320" v="42" actId="1076"/>
+          <ac:picMkLst>
+            <pc:docMk/>
+            <pc:sldMk cId="3048879607" sldId="266"/>
+            <ac:picMk id="2" creationId="{9BDDC0F9-6AE4-4EE0-1C40-B0BA8AD63F9A}"/>
+          </ac:picMkLst>
+        </pc:picChg>
+        <pc:picChg chg="add mod">
+          <ac:chgData name="Eardwulf Ulan" userId="S::18111@my.sanctamaria.school.nz::22607890-71d4-4bf2-b097-b426e6c19788" providerId="AD" clId="Web-{DC01E7D0-ECC4-24C5-E5BE-DE2A9FB64150}" dt="2023-05-17T10:19:36.945" v="41" actId="1076"/>
+          <ac:picMkLst>
+            <pc:docMk/>
+            <pc:sldMk cId="3048879607" sldId="266"/>
+            <ac:picMk id="3" creationId="{C119085B-8D6B-D96A-A128-A62B3C6E9217}"/>
+          </ac:picMkLst>
+        </pc:picChg>
+      </pc:sldChg>
+      <pc:sldChg chg="addSp modSp">
+        <pc:chgData name="Eardwulf Ulan" userId="S::18111@my.sanctamaria.school.nz::22607890-71d4-4bf2-b097-b426e6c19788" providerId="AD" clId="Web-{DC01E7D0-ECC4-24C5-E5BE-DE2A9FB64150}" dt="2023-05-17T10:15:06.638" v="17" actId="14100"/>
+        <pc:sldMkLst>
+          <pc:docMk/>
+          <pc:sldMk cId="578345274" sldId="267"/>
+        </pc:sldMkLst>
+        <pc:spChg chg="mod">
+          <ac:chgData name="Eardwulf Ulan" userId="S::18111@my.sanctamaria.school.nz::22607890-71d4-4bf2-b097-b426e6c19788" providerId="AD" clId="Web-{DC01E7D0-ECC4-24C5-E5BE-DE2A9FB64150}" dt="2023-05-17T10:13:57.370" v="2" actId="20577"/>
+          <ac:spMkLst>
+            <pc:docMk/>
+            <pc:sldMk cId="578345274" sldId="267"/>
+            <ac:spMk id="73" creationId="{00000000-0000-0000-0000-000000000000}"/>
+          </ac:spMkLst>
+        </pc:spChg>
+        <pc:picChg chg="add mod">
+          <ac:chgData name="Eardwulf Ulan" userId="S::18111@my.sanctamaria.school.nz::22607890-71d4-4bf2-b097-b426e6c19788" providerId="AD" clId="Web-{DC01E7D0-ECC4-24C5-E5BE-DE2A9FB64150}" dt="2023-05-17T10:15:06.638" v="17" actId="14100"/>
+          <ac:picMkLst>
+            <pc:docMk/>
+            <pc:sldMk cId="578345274" sldId="267"/>
+            <ac:picMk id="2" creationId="{EA1F0CD1-3449-0507-DE35-16F879065109}"/>
+          </ac:picMkLst>
+        </pc:picChg>
+      </pc:sldChg>
+      <pc:sldChg chg="modSp">
+        <pc:chgData name="Eardwulf Ulan" userId="S::18111@my.sanctamaria.school.nz::22607890-71d4-4bf2-b097-b426e6c19788" providerId="AD" clId="Web-{DC01E7D0-ECC4-24C5-E5BE-DE2A9FB64150}" dt="2023-05-17T10:21:52.792" v="44" actId="20577"/>
+        <pc:sldMkLst>
+          <pc:docMk/>
+          <pc:sldMk cId="638340319" sldId="268"/>
+        </pc:sldMkLst>
+        <pc:spChg chg="mod">
+          <ac:chgData name="Eardwulf Ulan" userId="S::18111@my.sanctamaria.school.nz::22607890-71d4-4bf2-b097-b426e6c19788" providerId="AD" clId="Web-{DC01E7D0-ECC4-24C5-E5BE-DE2A9FB64150}" dt="2023-05-17T10:21:52.792" v="44" actId="20577"/>
+          <ac:spMkLst>
+            <pc:docMk/>
+            <pc:sldMk cId="638340319" sldId="268"/>
+            <ac:spMk id="73" creationId="{00000000-0000-0000-0000-000000000000}"/>
+          </ac:spMkLst>
+        </pc:spChg>
+      </pc:sldChg>
+      <pc:sldChg chg="add ord replId">
+        <pc:chgData name="Eardwulf Ulan" userId="S::18111@my.sanctamaria.school.nz::22607890-71d4-4bf2-b097-b426e6c19788" providerId="AD" clId="Web-{DC01E7D0-ECC4-24C5-E5BE-DE2A9FB64150}" dt="2023-05-17T10:15:19.393" v="20"/>
+        <pc:sldMkLst>
+          <pc:docMk/>
+          <pc:sldMk cId="2125486748" sldId="270"/>
+        </pc:sldMkLst>
+      </pc:sldChg>
+      <pc:sldChg chg="add replId">
+        <pc:chgData name="Eardwulf Ulan" userId="S::18111@my.sanctamaria.school.nz::22607890-71d4-4bf2-b097-b426e6c19788" providerId="AD" clId="Web-{DC01E7D0-ECC4-24C5-E5BE-DE2A9FB64150}" dt="2023-05-17T10:15:17.435" v="19"/>
+        <pc:sldMkLst>
+          <pc:docMk/>
+          <pc:sldMk cId="1744829088" sldId="271"/>
+        </pc:sldMkLst>
+      </pc:sldChg>
+    </pc:docChg>
+  </pc:docChgLst>
   <pc:docChgLst>
     <pc:chgData name="Eardwulf Ulan" userId="22607890-71d4-4bf2-b097-b426e6c19788" providerId="ADAL" clId="{144C3C78-124B-466C-8FE1-23FD5A90EFF3}"/>
     <pc:docChg chg="custSel addSld modSld sldOrd addSection modSection">
@@ -505,53 +649,6 @@
             <ac:spMk id="78" creationId="{00000000-0000-0000-0000-000000000000}"/>
           </ac:spMkLst>
         </pc:spChg>
-      </pc:sldChg>
-    </pc:docChg>
-  </pc:docChgLst>
-  <pc:docChgLst>
-    <pc:chgData name="Eardwulf Ulan" userId="S::18111@my.sanctamaria.school.nz::22607890-71d4-4bf2-b097-b426e6c19788" providerId="AD" clId="Web-{6E88F79A-04E8-2644-5D52-BBE8D04264AC}"/>
-    <pc:docChg chg="modSld">
-      <pc:chgData name="Eardwulf Ulan" userId="S::18111@my.sanctamaria.school.nz::22607890-71d4-4bf2-b097-b426e6c19788" providerId="AD" clId="Web-{6E88F79A-04E8-2644-5D52-BBE8D04264AC}" dt="2023-05-17T09:17:16.146" v="7"/>
-      <pc:docMkLst>
-        <pc:docMk/>
-      </pc:docMkLst>
-      <pc:sldChg chg="modSp">
-        <pc:chgData name="Eardwulf Ulan" userId="S::18111@my.sanctamaria.school.nz::22607890-71d4-4bf2-b097-b426e6c19788" providerId="AD" clId="Web-{6E88F79A-04E8-2644-5D52-BBE8D04264AC}" dt="2023-05-17T09:17:11.380" v="5" actId="20577"/>
-        <pc:sldMkLst>
-          <pc:docMk/>
-          <pc:sldMk cId="0" sldId="256"/>
-        </pc:sldMkLst>
-        <pc:spChg chg="mod">
-          <ac:chgData name="Eardwulf Ulan" userId="S::18111@my.sanctamaria.school.nz::22607890-71d4-4bf2-b097-b426e6c19788" providerId="AD" clId="Web-{6E88F79A-04E8-2644-5D52-BBE8D04264AC}" dt="2023-05-17T09:17:11.380" v="5" actId="20577"/>
-          <ac:spMkLst>
-            <pc:docMk/>
-            <pc:sldMk cId="0" sldId="256"/>
-            <ac:spMk id="55" creationId="{00000000-0000-0000-0000-000000000000}"/>
-          </ac:spMkLst>
-        </pc:spChg>
-      </pc:sldChg>
-      <pc:sldChg chg="delSp">
-        <pc:chgData name="Eardwulf Ulan" userId="S::18111@my.sanctamaria.school.nz::22607890-71d4-4bf2-b097-b426e6c19788" providerId="AD" clId="Web-{6E88F79A-04E8-2644-5D52-BBE8D04264AC}" dt="2023-05-17T09:17:16.146" v="7"/>
-        <pc:sldMkLst>
-          <pc:docMk/>
-          <pc:sldMk cId="0" sldId="258"/>
-        </pc:sldMkLst>
-        <pc:picChg chg="del">
-          <ac:chgData name="Eardwulf Ulan" userId="S::18111@my.sanctamaria.school.nz::22607890-71d4-4bf2-b097-b426e6c19788" providerId="AD" clId="Web-{6E88F79A-04E8-2644-5D52-BBE8D04264AC}" dt="2023-05-17T09:17:14.740" v="6"/>
-          <ac:picMkLst>
-            <pc:docMk/>
-            <pc:sldMk cId="0" sldId="258"/>
-            <ac:picMk id="7" creationId="{059FCAF7-42B9-EC33-23CC-D0AB65EA9094}"/>
-          </ac:picMkLst>
-        </pc:picChg>
-        <pc:picChg chg="del">
-          <ac:chgData name="Eardwulf Ulan" userId="S::18111@my.sanctamaria.school.nz::22607890-71d4-4bf2-b097-b426e6c19788" providerId="AD" clId="Web-{6E88F79A-04E8-2644-5D52-BBE8D04264AC}" dt="2023-05-17T09:17:16.146" v="7"/>
-          <ac:picMkLst>
-            <pc:docMk/>
-            <pc:sldMk cId="0" sldId="258"/>
-            <ac:picMk id="9" creationId="{8A267450-5119-A659-4930-551991672E7A}"/>
-          </ac:picMkLst>
-        </pc:picChg>
       </pc:sldChg>
     </pc:docChg>
   </pc:docChgLst>
@@ -1435,6 +1532,224 @@
   <p:cSld>
     <p:spTree>
       <p:nvGrpSpPr>
+        <p:cNvPr id="1" name="Shape 69"/>
+        <p:cNvGrpSpPr/>
+        <p:nvPr/>
+      </p:nvGrpSpPr>
+      <p:grpSpPr>
+        <a:xfrm>
+          <a:off x="0" y="0"/>
+          <a:ext cx="0" cy="0"/>
+          <a:chOff x="0" y="0"/>
+          <a:chExt cx="0" cy="0"/>
+        </a:xfrm>
+      </p:grpSpPr>
+      <p:sp>
+        <p:nvSpPr>
+          <p:cNvPr id="70" name="Google Shape;70;gac10fef634_0_16:notes"/>
+          <p:cNvSpPr>
+            <a:spLocks noGrp="1" noRot="1" noChangeAspect="1"/>
+          </p:cNvSpPr>
+          <p:nvPr>
+            <p:ph type="sldImg" idx="2"/>
+          </p:nvPr>
+        </p:nvSpPr>
+        <p:spPr>
+          <a:xfrm>
+            <a:off x="381000" y="685800"/>
+            <a:ext cx="6096000" cy="3429000"/>
+          </a:xfrm>
+          <a:custGeom>
+            <a:avLst/>
+            <a:gdLst/>
+            <a:ahLst/>
+            <a:cxnLst/>
+            <a:rect l="l" t="t" r="r" b="b"/>
+            <a:pathLst>
+              <a:path w="120000" h="120000" extrusionOk="0">
+                <a:moveTo>
+                  <a:pt x="0" y="0"/>
+                </a:moveTo>
+                <a:lnTo>
+                  <a:pt x="120000" y="0"/>
+                </a:lnTo>
+                <a:lnTo>
+                  <a:pt x="120000" y="120000"/>
+                </a:lnTo>
+                <a:lnTo>
+                  <a:pt x="0" y="120000"/>
+                </a:lnTo>
+                <a:close/>
+              </a:path>
+            </a:pathLst>
+          </a:custGeom>
+        </p:spPr>
+      </p:sp>
+      <p:sp>
+        <p:nvSpPr>
+          <p:cNvPr id="71" name="Google Shape;71;gac10fef634_0_16:notes"/>
+          <p:cNvSpPr txBox="1">
+            <a:spLocks noGrp="1"/>
+          </p:cNvSpPr>
+          <p:nvPr>
+            <p:ph type="body" idx="1"/>
+          </p:nvPr>
+        </p:nvSpPr>
+        <p:spPr>
+          <a:xfrm>
+            <a:off x="685800" y="4343400"/>
+            <a:ext cx="5486400" cy="4114800"/>
+          </a:xfrm>
+          <a:prstGeom prst="rect">
+            <a:avLst/>
+          </a:prstGeom>
+        </p:spPr>
+        <p:txBody>
+          <a:bodyPr spcFirstLastPara="1" wrap="square" lIns="91425" tIns="91425" rIns="91425" bIns="91425" anchor="t" anchorCtr="0">
+            <a:noAutofit/>
+          </a:bodyPr>
+          <a:lstStyle/>
+          <a:p>
+            <a:pPr marL="0" lvl="0" indent="0" algn="l" rtl="0">
+              <a:spcBef>
+                <a:spcPts val="0"/>
+              </a:spcBef>
+              <a:spcAft>
+                <a:spcPts val="0"/>
+              </a:spcAft>
+              <a:buNone/>
+            </a:pPr>
+            <a:endParaRPr/>
+          </a:p>
+        </p:txBody>
+      </p:sp>
+    </p:spTree>
+    <p:extLst>
+      <p:ext uri="{BB962C8B-B14F-4D97-AF65-F5344CB8AC3E}">
+        <p14:creationId xmlns:p14="http://schemas.microsoft.com/office/powerpoint/2010/main" val="2488796568"/>
+      </p:ext>
+    </p:extLst>
+  </p:cSld>
+  <p:clrMapOvr>
+    <a:masterClrMapping/>
+  </p:clrMapOvr>
+</p:notes>
+</file>
+
+<file path=ppt/notesSlides/notesSlide14.xml><?xml version="1.0" encoding="utf-8"?>
+<p:notes xmlns:a="http://schemas.openxmlformats.org/drawingml/2006/main" xmlns:r="http://schemas.openxmlformats.org/officeDocument/2006/relationships" xmlns:p="http://schemas.openxmlformats.org/presentationml/2006/main" showMasterSp="0" showMasterPhAnim="0">
+  <p:cSld>
+    <p:spTree>
+      <p:nvGrpSpPr>
+        <p:cNvPr id="1" name="Shape 74"/>
+        <p:cNvGrpSpPr/>
+        <p:nvPr/>
+      </p:nvGrpSpPr>
+      <p:grpSpPr>
+        <a:xfrm>
+          <a:off x="0" y="0"/>
+          <a:ext cx="0" cy="0"/>
+          <a:chOff x="0" y="0"/>
+          <a:chExt cx="0" cy="0"/>
+        </a:xfrm>
+      </p:grpSpPr>
+      <p:sp>
+        <p:nvSpPr>
+          <p:cNvPr id="75" name="Google Shape;75;gac10fef634_0_20:notes"/>
+          <p:cNvSpPr>
+            <a:spLocks noGrp="1" noRot="1" noChangeAspect="1"/>
+          </p:cNvSpPr>
+          <p:nvPr>
+            <p:ph type="sldImg" idx="2"/>
+          </p:nvPr>
+        </p:nvSpPr>
+        <p:spPr>
+          <a:xfrm>
+            <a:off x="381000" y="685800"/>
+            <a:ext cx="6096000" cy="3429000"/>
+          </a:xfrm>
+          <a:custGeom>
+            <a:avLst/>
+            <a:gdLst/>
+            <a:ahLst/>
+            <a:cxnLst/>
+            <a:rect l="l" t="t" r="r" b="b"/>
+            <a:pathLst>
+              <a:path w="120000" h="120000" extrusionOk="0">
+                <a:moveTo>
+                  <a:pt x="0" y="0"/>
+                </a:moveTo>
+                <a:lnTo>
+                  <a:pt x="120000" y="0"/>
+                </a:lnTo>
+                <a:lnTo>
+                  <a:pt x="120000" y="120000"/>
+                </a:lnTo>
+                <a:lnTo>
+                  <a:pt x="0" y="120000"/>
+                </a:lnTo>
+                <a:close/>
+              </a:path>
+            </a:pathLst>
+          </a:custGeom>
+        </p:spPr>
+      </p:sp>
+      <p:sp>
+        <p:nvSpPr>
+          <p:cNvPr id="76" name="Google Shape;76;gac10fef634_0_20:notes"/>
+          <p:cNvSpPr txBox="1">
+            <a:spLocks noGrp="1"/>
+          </p:cNvSpPr>
+          <p:nvPr>
+            <p:ph type="body" idx="1"/>
+          </p:nvPr>
+        </p:nvSpPr>
+        <p:spPr>
+          <a:xfrm>
+            <a:off x="685800" y="4343400"/>
+            <a:ext cx="5486400" cy="4114800"/>
+          </a:xfrm>
+          <a:prstGeom prst="rect">
+            <a:avLst/>
+          </a:prstGeom>
+        </p:spPr>
+        <p:txBody>
+          <a:bodyPr spcFirstLastPara="1" wrap="square" lIns="91425" tIns="91425" rIns="91425" bIns="91425" anchor="t" anchorCtr="0">
+            <a:noAutofit/>
+          </a:bodyPr>
+          <a:lstStyle/>
+          <a:p>
+            <a:pPr marL="0" lvl="0" indent="0" algn="l" rtl="0">
+              <a:spcBef>
+                <a:spcPts val="0"/>
+              </a:spcBef>
+              <a:spcAft>
+                <a:spcPts val="0"/>
+              </a:spcAft>
+              <a:buNone/>
+            </a:pPr>
+            <a:endParaRPr/>
+          </a:p>
+        </p:txBody>
+      </p:sp>
+    </p:spTree>
+    <p:extLst>
+      <p:ext uri="{BB962C8B-B14F-4D97-AF65-F5344CB8AC3E}">
+        <p14:creationId xmlns:p14="http://schemas.microsoft.com/office/powerpoint/2010/main" val="2225728925"/>
+      </p:ext>
+    </p:extLst>
+  </p:cSld>
+  <p:clrMapOvr>
+    <a:masterClrMapping/>
+  </p:clrMapOvr>
+</p:notes>
+</file>
+
+<file path=ppt/notesSlides/notesSlide15.xml><?xml version="1.0" encoding="utf-8"?>
+<p:notes xmlns:a="http://schemas.openxmlformats.org/drawingml/2006/main" xmlns:r="http://schemas.openxmlformats.org/officeDocument/2006/relationships" xmlns:p="http://schemas.openxmlformats.org/presentationml/2006/main" showMasterSp="0" showMasterPhAnim="0">
+  <p:cSld>
+    <p:spTree>
+      <p:nvGrpSpPr>
         <p:cNvPr id="1" name="Shape 80"/>
         <p:cNvGrpSpPr/>
         <p:nvPr/>
@@ -1555,7 +1870,7 @@
 </p:notes>
 </file>
 
-<file path=ppt/notesSlides/notesSlide14.xml><?xml version="1.0" encoding="utf-8"?>
+<file path=ppt/notesSlides/notesSlide16.xml><?xml version="1.0" encoding="utf-8"?>
 <p:notes xmlns:a="http://schemas.openxmlformats.org/drawingml/2006/main" xmlns:r="http://schemas.openxmlformats.org/officeDocument/2006/relationships" xmlns:p="http://schemas.openxmlformats.org/presentationml/2006/main" showMasterSp="0" showMasterPhAnim="0">
   <p:cSld>
     <p:spTree>
@@ -7649,14 +7964,14 @@
           <p:nvPr>
             <p:extLst>
               <p:ext uri="{D42A27DB-BD31-4B8C-83A1-F6EECF244321}">
-                <p14:modId xmlns:p14="http://schemas.microsoft.com/office/powerpoint/2010/main" val="1120046976"/>
+                <p14:modId xmlns:p14="http://schemas.microsoft.com/office/powerpoint/2010/main" val="1167629249"/>
               </p:ext>
             </p:extLst>
           </p:nvPr>
         </p:nvGraphicFramePr>
         <p:xfrm>
           <a:off x="382475" y="1267725"/>
-          <a:ext cx="8520600" cy="914340"/>
+          <a:ext cx="8520600" cy="1462980"/>
         </p:xfrm>
         <a:graphic>
           <a:graphicData uri="http://schemas.openxmlformats.org/drawingml/2006/table">
@@ -7681,7 +7996,7 @@
                   </a:extLst>
                 </a:gridCol>
               </a:tblGrid>
-              <a:tr h="381000">
+              <a:tr h="248718">
                 <a:tc>
                   <a:txBody>
                     <a:bodyPr/>
@@ -7697,10 +8012,10 @@
                         <a:buNone/>
                       </a:pPr>
                       <a:r>
-                        <a:rPr lang="en" sz="1800" b="1"/>
+                        <a:rPr lang="en" sz="1800" b="1" dirty="0"/>
                         <a:t>Test Case</a:t>
                       </a:r>
-                      <a:endParaRPr sz="1800" b="1"/>
+                      <a:endParaRPr sz="1800" b="1" dirty="0"/>
                     </a:p>
                   </a:txBody>
                   <a:tcPr marL="91425" marR="91425" marT="91425" marB="91425">
@@ -7724,10 +8039,10 @@
                         <a:buNone/>
                       </a:pPr>
                       <a:r>
-                        <a:rPr lang="en" sz="1800" b="1"/>
+                        <a:rPr lang="en" sz="1800" b="1" dirty="0"/>
                         <a:t>Expected Values</a:t>
                       </a:r>
-                      <a:endParaRPr sz="1800" b="1"/>
+                      <a:endParaRPr sz="1800" b="1" dirty="0"/>
                     </a:p>
                   </a:txBody>
                   <a:tcPr marL="91425" marR="91425" marT="91425" marB="91425">
@@ -7742,7 +8057,7 @@
                   </a:ext>
                 </a:extLst>
               </a:tr>
-              <a:tr h="396200">
+              <a:tr h="547180">
                 <a:tc>
                   <a:txBody>
                     <a:bodyPr/>
@@ -7757,6 +8072,10 @@
                         </a:spcAft>
                         <a:buNone/>
                       </a:pPr>
+                      <a:r>
+                        <a:rPr lang="en-US" sz="1800" dirty="0"/>
+                        <a:t>Run Program</a:t>
+                      </a:r>
                       <a:endParaRPr sz="1800" dirty="0"/>
                     </a:p>
                   </a:txBody>
@@ -7767,7 +8086,7 @@
                     <a:bodyPr/>
                     <a:lstStyle/>
                     <a:p>
-                      <a:pPr marL="0" lvl="0" indent="0" algn="l" rtl="0">
+                      <a:pPr marL="0" lvl="0" indent="0" algn="l">
                         <a:spcBef>
                           <a:spcPts val="0"/>
                         </a:spcBef>
@@ -7776,7 +8095,16 @@
                         </a:spcAft>
                         <a:buNone/>
                       </a:pPr>
-                      <a:endParaRPr sz="1800" dirty="0"/>
+                      <a:r>
+                        <a:rPr lang="en-NZ" sz="1800" b="0" i="0" u="none" strike="noStrike" noProof="0" dirty="0">
+                          <a:solidFill>
+                            <a:srgbClr val="000000"/>
+                          </a:solidFill>
+                          <a:latin typeface="Arial"/>
+                        </a:rPr>
+                        <a:t>Print welcome message with a randomly generated name – Runs correctly</a:t>
+                      </a:r>
+                      <a:endParaRPr dirty="0"/>
                     </a:p>
                   </a:txBody>
                   <a:tcPr marL="91425" marR="91425" marT="91425" marB="91425"/>
@@ -7791,6 +8119,66 @@
           </a:graphicData>
         </a:graphic>
       </p:graphicFrame>
+      <p:pic>
+        <p:nvPicPr>
+          <p:cNvPr id="2" name="Picture 2" descr="Text&#10;&#10;Description automatically generated">
+            <a:extLst>
+              <a:ext uri="{FF2B5EF4-FFF2-40B4-BE49-F238E27FC236}">
+                <a16:creationId xmlns:a16="http://schemas.microsoft.com/office/drawing/2014/main" id="{9BDDC0F9-6AE4-4EE0-1C40-B0BA8AD63F9A}"/>
+              </a:ext>
+            </a:extLst>
+          </p:cNvPr>
+          <p:cNvPicPr>
+            <a:picLocks noChangeAspect="1"/>
+          </p:cNvPicPr>
+          <p:nvPr/>
+        </p:nvPicPr>
+        <p:blipFill>
+          <a:blip r:embed="rId3"/>
+          <a:stretch>
+            <a:fillRect/>
+          </a:stretch>
+        </p:blipFill>
+        <p:spPr>
+          <a:xfrm>
+            <a:off x="370778" y="2946757"/>
+            <a:ext cx="4199828" cy="1793857"/>
+          </a:xfrm>
+          <a:prstGeom prst="rect">
+            <a:avLst/>
+          </a:prstGeom>
+        </p:spPr>
+      </p:pic>
+      <p:pic>
+        <p:nvPicPr>
+          <p:cNvPr id="3" name="Picture 3" descr="Text&#10;&#10;Description automatically generated">
+            <a:extLst>
+              <a:ext uri="{FF2B5EF4-FFF2-40B4-BE49-F238E27FC236}">
+                <a16:creationId xmlns:a16="http://schemas.microsoft.com/office/drawing/2014/main" id="{C119085B-8D6B-D96A-A128-A62B3C6E9217}"/>
+              </a:ext>
+            </a:extLst>
+          </p:cNvPr>
+          <p:cNvPicPr>
+            <a:picLocks noChangeAspect="1"/>
+          </p:cNvPicPr>
+          <p:nvPr/>
+        </p:nvPicPr>
+        <p:blipFill>
+          <a:blip r:embed="rId4"/>
+          <a:stretch>
+            <a:fillRect/>
+          </a:stretch>
+        </p:blipFill>
+        <p:spPr>
+          <a:xfrm>
+            <a:off x="4573393" y="2809828"/>
+            <a:ext cx="4255584" cy="1991050"/>
+          </a:xfrm>
+          <a:prstGeom prst="rect">
+            <a:avLst/>
+          </a:prstGeom>
+        </p:spPr>
+      </p:pic>
     </p:spTree>
     <p:extLst>
       <p:ext uri="{BB962C8B-B14F-4D97-AF65-F5344CB8AC3E}">
@@ -7864,10 +8252,10 @@
               <a:buNone/>
             </a:pPr>
             <a:r>
-              <a:rPr lang="en" dirty="0"/>
-              <a:t>Component _ Ver. _(Trello screenshot)</a:t>
+              <a:rPr lang="en"/>
+              <a:t>Component 2 Ver. 1(Trello screenshot)</a:t>
             </a:r>
-            <a:endParaRPr dirty="0"/>
+            <a:endParaRPr/>
           </a:p>
         </p:txBody>
       </p:sp>
@@ -8112,6 +8500,301 @@
     </p:bg>
     <p:spTree>
       <p:nvGrpSpPr>
+        <p:cNvPr id="1" name="Shape 72"/>
+        <p:cNvGrpSpPr/>
+        <p:nvPr/>
+      </p:nvGrpSpPr>
+      <p:grpSpPr>
+        <a:xfrm>
+          <a:off x="0" y="0"/>
+          <a:ext cx="0" cy="0"/>
+          <a:chOff x="0" y="0"/>
+          <a:chExt cx="0" cy="0"/>
+        </a:xfrm>
+      </p:grpSpPr>
+      <p:sp>
+        <p:nvSpPr>
+          <p:cNvPr id="73" name="Google Shape;73;p16"/>
+          <p:cNvSpPr txBox="1">
+            <a:spLocks noGrp="1"/>
+          </p:cNvSpPr>
+          <p:nvPr>
+            <p:ph type="title"/>
+          </p:nvPr>
+        </p:nvSpPr>
+        <p:spPr>
+          <a:xfrm>
+            <a:off x="311700" y="445025"/>
+            <a:ext cx="8520600" cy="572700"/>
+          </a:xfrm>
+          <a:prstGeom prst="rect">
+            <a:avLst/>
+          </a:prstGeom>
+        </p:spPr>
+        <p:txBody>
+          <a:bodyPr spcFirstLastPara="1" wrap="square" lIns="91425" tIns="91425" rIns="91425" bIns="91425" anchor="t" anchorCtr="0">
+            <a:noAutofit/>
+          </a:bodyPr>
+          <a:lstStyle/>
+          <a:p>
+            <a:pPr marL="0" lvl="0" indent="0" algn="l" rtl="0">
+              <a:spcBef>
+                <a:spcPts val="0"/>
+              </a:spcBef>
+              <a:spcAft>
+                <a:spcPts val="0"/>
+              </a:spcAft>
+              <a:buNone/>
+            </a:pPr>
+            <a:r>
+              <a:rPr lang="en" dirty="0"/>
+              <a:t>Component _ Ver. _(Trello screenshot)</a:t>
+            </a:r>
+            <a:endParaRPr dirty="0"/>
+          </a:p>
+        </p:txBody>
+      </p:sp>
+    </p:spTree>
+    <p:extLst>
+      <p:ext uri="{BB962C8B-B14F-4D97-AF65-F5344CB8AC3E}">
+        <p14:creationId xmlns:p14="http://schemas.microsoft.com/office/powerpoint/2010/main" val="2125486748"/>
+      </p:ext>
+    </p:extLst>
+  </p:cSld>
+  <p:clrMapOvr>
+    <a:masterClrMapping/>
+  </p:clrMapOvr>
+</p:sld>
+</file>
+
+<file path=ppt/slides/slide14.xml><?xml version="1.0" encoding="utf-8"?>
+<p:sld xmlns:a="http://schemas.openxmlformats.org/drawingml/2006/main" xmlns:r="http://schemas.openxmlformats.org/officeDocument/2006/relationships" xmlns:p="http://schemas.openxmlformats.org/presentationml/2006/main">
+  <p:cSld>
+    <p:spTree>
+      <p:nvGrpSpPr>
+        <p:cNvPr id="1" name="Shape 77"/>
+        <p:cNvGrpSpPr/>
+        <p:nvPr/>
+      </p:nvGrpSpPr>
+      <p:grpSpPr>
+        <a:xfrm>
+          <a:off x="0" y="0"/>
+          <a:ext cx="0" cy="0"/>
+          <a:chOff x="0" y="0"/>
+          <a:chExt cx="0" cy="0"/>
+        </a:xfrm>
+      </p:grpSpPr>
+      <p:sp>
+        <p:nvSpPr>
+          <p:cNvPr id="78" name="Google Shape;78;p17"/>
+          <p:cNvSpPr txBox="1">
+            <a:spLocks noGrp="1"/>
+          </p:cNvSpPr>
+          <p:nvPr>
+            <p:ph type="title"/>
+          </p:nvPr>
+        </p:nvSpPr>
+        <p:spPr>
+          <a:xfrm>
+            <a:off x="311700" y="445025"/>
+            <a:ext cx="8520600" cy="572700"/>
+          </a:xfrm>
+          <a:prstGeom prst="rect">
+            <a:avLst/>
+          </a:prstGeom>
+        </p:spPr>
+        <p:txBody>
+          <a:bodyPr spcFirstLastPara="1" wrap="square" lIns="91425" tIns="91425" rIns="91425" bIns="91425" anchor="t" anchorCtr="0">
+            <a:noAutofit/>
+          </a:bodyPr>
+          <a:lstStyle/>
+          <a:p>
+            <a:pPr marL="0" lvl="0" indent="0" algn="l" rtl="0">
+              <a:spcBef>
+                <a:spcPts val="0"/>
+              </a:spcBef>
+              <a:spcAft>
+                <a:spcPts val="0"/>
+              </a:spcAft>
+              <a:buNone/>
+            </a:pPr>
+            <a:r>
+              <a:rPr lang="en" dirty="0"/>
+              <a:t>Component _ Ver. _ - Test Plan (and screenshot)</a:t>
+            </a:r>
+            <a:endParaRPr dirty="0"/>
+          </a:p>
+        </p:txBody>
+      </p:sp>
+      <p:graphicFrame>
+        <p:nvGraphicFramePr>
+          <p:cNvPr id="79" name="Google Shape;79;p17"/>
+          <p:cNvGraphicFramePr/>
+          <p:nvPr/>
+        </p:nvGraphicFramePr>
+        <p:xfrm>
+          <a:off x="382475" y="1267725"/>
+          <a:ext cx="8520600" cy="914340"/>
+        </p:xfrm>
+        <a:graphic>
+          <a:graphicData uri="http://schemas.openxmlformats.org/drawingml/2006/table">
+            <a:tbl>
+              <a:tblPr>
+                <a:noFill/>
+                <a:tableStyleId>{E1099E06-0E6B-448D-9D27-60429F06E6F4}</a:tableStyleId>
+              </a:tblPr>
+              <a:tblGrid>
+                <a:gridCol w="4196249">
+                  <a:extLst>
+                    <a:ext uri="{9D8B030D-6E8A-4147-A177-3AD203B41FA5}">
+                      <a16:colId xmlns:a16="http://schemas.microsoft.com/office/drawing/2014/main" val="20000"/>
+                    </a:ext>
+                  </a:extLst>
+                </a:gridCol>
+                <a:gridCol w="4324351">
+                  <a:extLst>
+                    <a:ext uri="{9D8B030D-6E8A-4147-A177-3AD203B41FA5}">
+                      <a16:colId xmlns:a16="http://schemas.microsoft.com/office/drawing/2014/main" val="20001"/>
+                    </a:ext>
+                  </a:extLst>
+                </a:gridCol>
+              </a:tblGrid>
+              <a:tr h="381000">
+                <a:tc>
+                  <a:txBody>
+                    <a:bodyPr/>
+                    <a:lstStyle/>
+                    <a:p>
+                      <a:pPr marL="0" lvl="0" indent="0" algn="l" rtl="0">
+                        <a:spcBef>
+                          <a:spcPts val="0"/>
+                        </a:spcBef>
+                        <a:spcAft>
+                          <a:spcPts val="0"/>
+                        </a:spcAft>
+                        <a:buNone/>
+                      </a:pPr>
+                      <a:r>
+                        <a:rPr lang="en" sz="1800" b="1"/>
+                        <a:t>Test Case</a:t>
+                      </a:r>
+                      <a:endParaRPr sz="1800" b="1"/>
+                    </a:p>
+                  </a:txBody>
+                  <a:tcPr marL="91425" marR="91425" marT="91425" marB="91425">
+                    <a:solidFill>
+                      <a:srgbClr val="CCCCCC"/>
+                    </a:solidFill>
+                  </a:tcPr>
+                </a:tc>
+                <a:tc>
+                  <a:txBody>
+                    <a:bodyPr/>
+                    <a:lstStyle/>
+                    <a:p>
+                      <a:pPr marL="0" lvl="0" indent="0" algn="l" rtl="0">
+                        <a:spcBef>
+                          <a:spcPts val="0"/>
+                        </a:spcBef>
+                        <a:spcAft>
+                          <a:spcPts val="0"/>
+                        </a:spcAft>
+                        <a:buNone/>
+                      </a:pPr>
+                      <a:r>
+                        <a:rPr lang="en" sz="1800" b="1"/>
+                        <a:t>Expected Values</a:t>
+                      </a:r>
+                      <a:endParaRPr sz="1800" b="1"/>
+                    </a:p>
+                  </a:txBody>
+                  <a:tcPr marL="91425" marR="91425" marT="91425" marB="91425">
+                    <a:solidFill>
+                      <a:srgbClr val="CCCCCC"/>
+                    </a:solidFill>
+                  </a:tcPr>
+                </a:tc>
+                <a:extLst>
+                  <a:ext uri="{0D108BD9-81ED-4DB2-BD59-A6C34878D82A}">
+                    <a16:rowId xmlns:a16="http://schemas.microsoft.com/office/drawing/2014/main" val="10000"/>
+                  </a:ext>
+                </a:extLst>
+              </a:tr>
+              <a:tr h="396200">
+                <a:tc>
+                  <a:txBody>
+                    <a:bodyPr/>
+                    <a:lstStyle/>
+                    <a:p>
+                      <a:pPr marL="0" lvl="0" indent="0" algn="l" rtl="0">
+                        <a:spcBef>
+                          <a:spcPts val="0"/>
+                        </a:spcBef>
+                        <a:spcAft>
+                          <a:spcPts val="0"/>
+                        </a:spcAft>
+                        <a:buNone/>
+                      </a:pPr>
+                      <a:endParaRPr sz="1800" dirty="0"/>
+                    </a:p>
+                  </a:txBody>
+                  <a:tcPr marL="91425" marR="91425" marT="91425" marB="91425"/>
+                </a:tc>
+                <a:tc>
+                  <a:txBody>
+                    <a:bodyPr/>
+                    <a:lstStyle/>
+                    <a:p>
+                      <a:pPr marL="0" lvl="0" indent="0" algn="l" rtl="0">
+                        <a:spcBef>
+                          <a:spcPts val="0"/>
+                        </a:spcBef>
+                        <a:spcAft>
+                          <a:spcPts val="0"/>
+                        </a:spcAft>
+                        <a:buNone/>
+                      </a:pPr>
+                      <a:endParaRPr sz="1800" dirty="0"/>
+                    </a:p>
+                  </a:txBody>
+                  <a:tcPr marL="91425" marR="91425" marT="91425" marB="91425"/>
+                </a:tc>
+                <a:extLst>
+                  <a:ext uri="{0D108BD9-81ED-4DB2-BD59-A6C34878D82A}">
+                    <a16:rowId xmlns:a16="http://schemas.microsoft.com/office/drawing/2014/main" val="10001"/>
+                  </a:ext>
+                </a:extLst>
+              </a:tr>
+            </a:tbl>
+          </a:graphicData>
+        </a:graphic>
+      </p:graphicFrame>
+    </p:spTree>
+    <p:extLst>
+      <p:ext uri="{BB962C8B-B14F-4D97-AF65-F5344CB8AC3E}">
+        <p14:creationId xmlns:p14="http://schemas.microsoft.com/office/powerpoint/2010/main" val="1744829088"/>
+      </p:ext>
+    </p:extLst>
+  </p:cSld>
+  <p:clrMapOvr>
+    <a:masterClrMapping/>
+  </p:clrMapOvr>
+</p:sld>
+</file>
+
+<file path=ppt/slides/slide15.xml><?xml version="1.0" encoding="utf-8"?>
+<p:sld xmlns:a="http://schemas.openxmlformats.org/drawingml/2006/main" xmlns:r="http://schemas.openxmlformats.org/officeDocument/2006/relationships" xmlns:p="http://schemas.openxmlformats.org/presentationml/2006/main">
+  <p:cSld>
+    <p:bg>
+      <p:bgPr>
+        <a:solidFill>
+          <a:srgbClr val="D9EAD3"/>
+        </a:solidFill>
+        <a:effectLst/>
+      </p:bgPr>
+    </p:bg>
+    <p:spTree>
+      <p:nvGrpSpPr>
         <p:cNvPr id="1" name="Shape 83"/>
         <p:cNvGrpSpPr/>
         <p:nvPr/>
@@ -8220,7 +8903,7 @@
 </p:sld>
 </file>
 
-<file path=ppt/slides/slide14.xml><?xml version="1.0" encoding="utf-8"?>
+<file path=ppt/slides/slide16.xml><?xml version="1.0" encoding="utf-8"?>
 <p:sld xmlns:a="http://schemas.openxmlformats.org/drawingml/2006/main" xmlns:r="http://schemas.openxmlformats.org/officeDocument/2006/relationships" xmlns:p="http://schemas.openxmlformats.org/presentationml/2006/main">
   <p:cSld>
     <p:bg>
@@ -9707,12 +10390,42 @@
             </a:pPr>
             <a:r>
               <a:rPr lang="en" dirty="0"/>
-              <a:t>Component _ Ver. _ (Trello screenshot)</a:t>
+              <a:t>Component 1 Ver. 2 (Trello screenshot)</a:t>
             </a:r>
             <a:endParaRPr dirty="0"/>
           </a:p>
         </p:txBody>
       </p:sp>
+      <p:pic>
+        <p:nvPicPr>
+          <p:cNvPr id="2" name="Picture 2" descr="Graphical user interface, application&#10;&#10;Description automatically generated">
+            <a:extLst>
+              <a:ext uri="{FF2B5EF4-FFF2-40B4-BE49-F238E27FC236}">
+                <a16:creationId xmlns:a16="http://schemas.microsoft.com/office/drawing/2014/main" id="{EA1F0CD1-3449-0507-DE35-16F879065109}"/>
+              </a:ext>
+            </a:extLst>
+          </p:cNvPr>
+          <p:cNvPicPr>
+            <a:picLocks noChangeAspect="1"/>
+          </p:cNvPicPr>
+          <p:nvPr/>
+        </p:nvPicPr>
+        <p:blipFill>
+          <a:blip r:embed="rId3"/>
+          <a:stretch>
+            <a:fillRect/>
+          </a:stretch>
+        </p:blipFill>
+        <p:spPr>
+          <a:xfrm>
+            <a:off x="1248937" y="1332879"/>
+            <a:ext cx="6646126" cy="3341960"/>
+          </a:xfrm>
+          <a:prstGeom prst="rect">
+            <a:avLst/>
+          </a:prstGeom>
+        </p:spPr>
+      </p:pic>
     </p:spTree>
     <p:extLst>
       <p:ext uri="{BB962C8B-B14F-4D97-AF65-F5344CB8AC3E}">
@@ -10289,14 +11002,6 @@
 </file>
 
 <file path=customXml/item1.xml><?xml version="1.0" encoding="utf-8"?>
-<p:properties xmlns:p="http://schemas.microsoft.com/office/2006/metadata/properties" xmlns:xsi="http://www.w3.org/2001/XMLSchema-instance" xmlns:pc="http://schemas.microsoft.com/office/infopath/2007/PartnerControls">
-  <documentManagement>
-    <_activity xmlns="2b310483-19ef-4f1a-8666-427aba7c04f4" xsi:nil="true"/>
-  </documentManagement>
-</p:properties>
-</file>
-
-<file path=customXml/item2.xml><?xml version="1.0" encoding="utf-8"?>
 <ct:contentTypeSchema xmlns:ct="http://schemas.microsoft.com/office/2006/metadata/contentType" xmlns:ma="http://schemas.microsoft.com/office/2006/metadata/properties/metaAttributes" ct:_="" ma:_="" ma:contentTypeName="Document" ma:contentTypeID="0x010100024DC8DFD6C93447A9C11B519434E451" ma:contentTypeVersion="13" ma:contentTypeDescription="Create a new document." ma:contentTypeScope="" ma:versionID="d78c653d52c678877916f644d9003a4b">
   <xsd:schema xmlns:xsd="http://www.w3.org/2001/XMLSchema" xmlns:xs="http://www.w3.org/2001/XMLSchema" xmlns:p="http://schemas.microsoft.com/office/2006/metadata/properties" xmlns:ns3="2b310483-19ef-4f1a-8666-427aba7c04f4" xmlns:ns4="d316a0db-0591-438e-8093-79f3efde1904" targetNamespace="http://schemas.microsoft.com/office/2006/metadata/properties" ma:root="true" ma:fieldsID="b51e56a0bc6a455bf4c7a7bc9489865b" ns3:_="" ns4:_="">
     <xsd:import namespace="2b310483-19ef-4f1a-8666-427aba7c04f4"/>
@@ -10519,6 +11224,14 @@
 </ct:contentTypeSchema>
 </file>
 
+<file path=customXml/item2.xml><?xml version="1.0" encoding="utf-8"?>
+<p:properties xmlns:p="http://schemas.microsoft.com/office/2006/metadata/properties" xmlns:xsi="http://www.w3.org/2001/XMLSchema-instance" xmlns:pc="http://schemas.microsoft.com/office/infopath/2007/PartnerControls">
+  <documentManagement>
+    <_activity xmlns="2b310483-19ef-4f1a-8666-427aba7c04f4" xsi:nil="true"/>
+  </documentManagement>
+</p:properties>
+</file>
+
 <file path=customXml/item3.xml><?xml version="1.0" encoding="utf-8"?>
 <?mso-contentType ?>
 <FormTemplates xmlns="http://schemas.microsoft.com/sharepoint/v3/contenttype/forms">
@@ -10529,23 +11242,6 @@
 </file>
 
 <file path=customXml/itemProps1.xml><?xml version="1.0" encoding="utf-8"?>
-<ds:datastoreItem xmlns:ds="http://schemas.openxmlformats.org/officeDocument/2006/customXml" ds:itemID="{68DCCC3C-0DB3-455E-8505-0D93175A8009}">
-  <ds:schemaRefs>
-    <ds:schemaRef ds:uri="d316a0db-0591-438e-8093-79f3efde1904"/>
-    <ds:schemaRef ds:uri="http://schemas.microsoft.com/office/2006/documentManagement/types"/>
-    <ds:schemaRef ds:uri="2b310483-19ef-4f1a-8666-427aba7c04f4"/>
-    <ds:schemaRef ds:uri="http://www.w3.org/XML/1998/namespace"/>
-    <ds:schemaRef ds:uri="http://purl.org/dc/elements/1.1/"/>
-    <ds:schemaRef ds:uri="http://purl.org/dc/dcmitype/"/>
-    <ds:schemaRef ds:uri="http://purl.org/dc/terms/"/>
-    <ds:schemaRef ds:uri="http://schemas.microsoft.com/office/infopath/2007/PartnerControls"/>
-    <ds:schemaRef ds:uri="http://schemas.openxmlformats.org/package/2006/metadata/core-properties"/>
-    <ds:schemaRef ds:uri="http://schemas.microsoft.com/office/2006/metadata/properties"/>
-  </ds:schemaRefs>
-</ds:datastoreItem>
-</file>
-
-<file path=customXml/itemProps2.xml><?xml version="1.0" encoding="utf-8"?>
 <ds:datastoreItem xmlns:ds="http://schemas.openxmlformats.org/officeDocument/2006/customXml" ds:itemID="{0E32B551-2E7E-4680-9EB8-D0B1C8724946}">
   <ds:schemaRefs>
     <ds:schemaRef ds:uri="http://schemas.microsoft.com/office/2006/metadata/contentType"/>
@@ -10564,6 +11260,23 @@
 </ds:datastoreItem>
 </file>
 
+<file path=customXml/itemProps2.xml><?xml version="1.0" encoding="utf-8"?>
+<ds:datastoreItem xmlns:ds="http://schemas.openxmlformats.org/officeDocument/2006/customXml" ds:itemID="{68DCCC3C-0DB3-455E-8505-0D93175A8009}">
+  <ds:schemaRefs>
+    <ds:schemaRef ds:uri="d316a0db-0591-438e-8093-79f3efde1904"/>
+    <ds:schemaRef ds:uri="http://schemas.microsoft.com/office/2006/documentManagement/types"/>
+    <ds:schemaRef ds:uri="2b310483-19ef-4f1a-8666-427aba7c04f4"/>
+    <ds:schemaRef ds:uri="http://www.w3.org/XML/1998/namespace"/>
+    <ds:schemaRef ds:uri="http://purl.org/dc/elements/1.1/"/>
+    <ds:schemaRef ds:uri="http://purl.org/dc/dcmitype/"/>
+    <ds:schemaRef ds:uri="http://purl.org/dc/terms/"/>
+    <ds:schemaRef ds:uri="http://schemas.microsoft.com/office/infopath/2007/PartnerControls"/>
+    <ds:schemaRef ds:uri="http://schemas.openxmlformats.org/package/2006/metadata/core-properties"/>
+    <ds:schemaRef ds:uri="http://schemas.microsoft.com/office/2006/metadata/properties"/>
+  </ds:schemaRefs>
+</ds:datastoreItem>
+</file>
+
 <file path=customXml/itemProps3.xml><?xml version="1.0" encoding="utf-8"?>
 <ds:datastoreItem xmlns:ds="http://schemas.openxmlformats.org/officeDocument/2006/customXml" ds:itemID="{9B757C8B-782F-4BDF-9F90-4601D3A0F6AF}">
   <ds:schemaRefs>

</xml_diff>

<commit_message>
Implemented deliverypickup_v5.py as a component
Added deliverypickup_v5.py as a component of pizzabot.py
</commit_message>
<xml_diff>
--- a/pizzapowerpoint.pptx
+++ b/pizzapowerpoint.pptx
@@ -335,7 +335,7 @@
     <p1510:client id="{597EAEB2-F50F-160F-61EB-A2437C088CEE}" v="129" dt="2023-05-18T00:12:22.906"/>
     <p1510:client id="{6E88F79A-04E8-2644-5D52-BBE8D04264AC}" v="8" dt="2023-05-17T09:17:16.146"/>
     <p1510:client id="{DC01E7D0-ECC4-24C5-E5BE-DE2A9FB64150}" v="54" dt="2023-05-17T10:21:52.792"/>
-    <p1510:client id="{EEA164D0-AAA0-D66E-99E2-4DAFD6A87FD6}" v="483" dt="2023-05-18T09:29:03.585"/>
+    <p1510:client id="{EEA164D0-AAA0-D66E-99E2-4DAFD6A87FD6}" v="491" dt="2023-05-18T10:08:26.858"/>
   </p1510:revLst>
 </p1510:revInfo>
 </file>
@@ -390,195 +390,9 @@
     </pc:docChg>
   </pc:docChgLst>
   <pc:docChgLst>
-    <pc:chgData name="Eardwulf Ulan" userId="S::18111@my.sanctamaria.school.nz::22607890-71d4-4bf2-b097-b426e6c19788" providerId="AD" clId="Web-{597EAEB2-F50F-160F-61EB-A2437C088CEE}"/>
-    <pc:docChg chg="modSld">
-      <pc:chgData name="Eardwulf Ulan" userId="S::18111@my.sanctamaria.school.nz::22607890-71d4-4bf2-b097-b426e6c19788" providerId="AD" clId="Web-{597EAEB2-F50F-160F-61EB-A2437C088CEE}" dt="2023-05-18T00:12:17.453" v="104"/>
-      <pc:docMkLst>
-        <pc:docMk/>
-      </pc:docMkLst>
-      <pc:sldChg chg="modSp">
-        <pc:chgData name="Eardwulf Ulan" userId="S::18111@my.sanctamaria.school.nz::22607890-71d4-4bf2-b097-b426e6c19788" providerId="AD" clId="Web-{597EAEB2-F50F-160F-61EB-A2437C088CEE}" dt="2023-05-18T00:12:00.686" v="90"/>
-        <pc:sldMkLst>
-          <pc:docMk/>
-          <pc:sldMk cId="3048879607" sldId="266"/>
-        </pc:sldMkLst>
-        <pc:graphicFrameChg chg="mod modGraphic">
-          <ac:chgData name="Eardwulf Ulan" userId="S::18111@my.sanctamaria.school.nz::22607890-71d4-4bf2-b097-b426e6c19788" providerId="AD" clId="Web-{597EAEB2-F50F-160F-61EB-A2437C088CEE}" dt="2023-05-18T00:12:00.686" v="90"/>
-          <ac:graphicFrameMkLst>
-            <pc:docMk/>
-            <pc:sldMk cId="3048879607" sldId="266"/>
-            <ac:graphicFrameMk id="79" creationId="{00000000-0000-0000-0000-000000000000}"/>
-          </ac:graphicFrameMkLst>
-        </pc:graphicFrameChg>
-      </pc:sldChg>
-      <pc:sldChg chg="modSp">
-        <pc:chgData name="Eardwulf Ulan" userId="S::18111@my.sanctamaria.school.nz::22607890-71d4-4bf2-b097-b426e6c19788" providerId="AD" clId="Web-{597EAEB2-F50F-160F-61EB-A2437C088CEE}" dt="2023-05-18T00:12:10.015" v="92"/>
-        <pc:sldMkLst>
-          <pc:docMk/>
-          <pc:sldMk cId="1713692142" sldId="269"/>
-        </pc:sldMkLst>
-        <pc:graphicFrameChg chg="mod modGraphic">
-          <ac:chgData name="Eardwulf Ulan" userId="S::18111@my.sanctamaria.school.nz::22607890-71d4-4bf2-b097-b426e6c19788" providerId="AD" clId="Web-{597EAEB2-F50F-160F-61EB-A2437C088CEE}" dt="2023-05-18T00:12:10.015" v="92"/>
-          <ac:graphicFrameMkLst>
-            <pc:docMk/>
-            <pc:sldMk cId="1713692142" sldId="269"/>
-            <ac:graphicFrameMk id="79" creationId="{00000000-0000-0000-0000-000000000000}"/>
-          </ac:graphicFrameMkLst>
-        </pc:graphicFrameChg>
-      </pc:sldChg>
-      <pc:sldChg chg="addSp modSp">
-        <pc:chgData name="Eardwulf Ulan" userId="S::18111@my.sanctamaria.school.nz::22607890-71d4-4bf2-b097-b426e6c19788" providerId="AD" clId="Web-{597EAEB2-F50F-160F-61EB-A2437C088CEE}" dt="2023-05-18T00:12:17.453" v="104"/>
-        <pc:sldMkLst>
-          <pc:docMk/>
-          <pc:sldMk cId="1744829088" sldId="271"/>
-        </pc:sldMkLst>
-        <pc:spChg chg="add mod">
-          <ac:chgData name="Eardwulf Ulan" userId="S::18111@my.sanctamaria.school.nz::22607890-71d4-4bf2-b097-b426e6c19788" providerId="AD" clId="Web-{597EAEB2-F50F-160F-61EB-A2437C088CEE}" dt="2023-05-18T00:09:35.291" v="27" actId="1076"/>
-          <ac:spMkLst>
-            <pc:docMk/>
-            <pc:sldMk cId="1744829088" sldId="271"/>
-            <ac:spMk id="5" creationId="{90F5EE74-B6EB-BA14-5B25-0D2113AFF263}"/>
-          </ac:spMkLst>
-        </pc:spChg>
-        <pc:spChg chg="add mod">
-          <ac:chgData name="Eardwulf Ulan" userId="S::18111@my.sanctamaria.school.nz::22607890-71d4-4bf2-b097-b426e6c19788" providerId="AD" clId="Web-{597EAEB2-F50F-160F-61EB-A2437C088CEE}" dt="2023-05-18T00:09:53.760" v="35" actId="14100"/>
-          <ac:spMkLst>
-            <pc:docMk/>
-            <pc:sldMk cId="1744829088" sldId="271"/>
-            <ac:spMk id="6" creationId="{E3F9A34D-F561-BE90-58AE-A0B824329799}"/>
-          </ac:spMkLst>
-        </pc:spChg>
-        <pc:graphicFrameChg chg="mod modGraphic">
-          <ac:chgData name="Eardwulf Ulan" userId="S::18111@my.sanctamaria.school.nz::22607890-71d4-4bf2-b097-b426e6c19788" providerId="AD" clId="Web-{597EAEB2-F50F-160F-61EB-A2437C088CEE}" dt="2023-05-18T00:12:17.453" v="104"/>
-          <ac:graphicFrameMkLst>
-            <pc:docMk/>
-            <pc:sldMk cId="1744829088" sldId="271"/>
-            <ac:graphicFrameMk id="79" creationId="{00000000-0000-0000-0000-000000000000}"/>
-          </ac:graphicFrameMkLst>
-        </pc:graphicFrameChg>
-        <pc:picChg chg="mod">
-          <ac:chgData name="Eardwulf Ulan" userId="S::18111@my.sanctamaria.school.nz::22607890-71d4-4bf2-b097-b426e6c19788" providerId="AD" clId="Web-{597EAEB2-F50F-160F-61EB-A2437C088CEE}" dt="2023-05-18T00:08:38.585" v="8" actId="1076"/>
-          <ac:picMkLst>
-            <pc:docMk/>
-            <pc:sldMk cId="1744829088" sldId="271"/>
-            <ac:picMk id="2" creationId="{B56E88FD-1437-5CE3-DB07-3D1049B39886}"/>
-          </ac:picMkLst>
-        </pc:picChg>
-        <pc:picChg chg="mod">
-          <ac:chgData name="Eardwulf Ulan" userId="S::18111@my.sanctamaria.school.nz::22607890-71d4-4bf2-b097-b426e6c19788" providerId="AD" clId="Web-{597EAEB2-F50F-160F-61EB-A2437C088CEE}" dt="2023-05-18T00:08:25.522" v="4" actId="1076"/>
-          <ac:picMkLst>
-            <pc:docMk/>
-            <pc:sldMk cId="1744829088" sldId="271"/>
-            <ac:picMk id="3" creationId="{C1ABCF39-DA20-BF54-AF3D-5898B138441A}"/>
-          </ac:picMkLst>
-        </pc:picChg>
-        <pc:picChg chg="add mod">
-          <ac:chgData name="Eardwulf Ulan" userId="S::18111@my.sanctamaria.school.nz::22607890-71d4-4bf2-b097-b426e6c19788" providerId="AD" clId="Web-{597EAEB2-F50F-160F-61EB-A2437C088CEE}" dt="2023-05-18T00:08:36.523" v="7" actId="1076"/>
-          <ac:picMkLst>
-            <pc:docMk/>
-            <pc:sldMk cId="1744829088" sldId="271"/>
-            <ac:picMk id="4" creationId="{3BC4EC35-42FC-1134-F922-409FA29628BB}"/>
-          </ac:picMkLst>
-        </pc:picChg>
-      </pc:sldChg>
-    </pc:docChg>
-  </pc:docChgLst>
-  <pc:docChgLst>
-    <pc:chgData name="Eardwulf Ulan" userId="S::18111@my.sanctamaria.school.nz::22607890-71d4-4bf2-b097-b426e6c19788" providerId="AD" clId="Web-{DC01E7D0-ECC4-24C5-E5BE-DE2A9FB64150}"/>
-    <pc:docChg chg="addSld modSld sldOrd modSection">
-      <pc:chgData name="Eardwulf Ulan" userId="S::18111@my.sanctamaria.school.nz::22607890-71d4-4bf2-b097-b426e6c19788" providerId="AD" clId="Web-{DC01E7D0-ECC4-24C5-E5BE-DE2A9FB64150}" dt="2023-05-17T10:21:52.792" v="44" actId="20577"/>
-      <pc:docMkLst>
-        <pc:docMk/>
-      </pc:docMkLst>
-      <pc:sldChg chg="addSp modSp">
-        <pc:chgData name="Eardwulf Ulan" userId="S::18111@my.sanctamaria.school.nz::22607890-71d4-4bf2-b097-b426e6c19788" providerId="AD" clId="Web-{DC01E7D0-ECC4-24C5-E5BE-DE2A9FB64150}" dt="2023-05-17T10:19:41.320" v="42" actId="1076"/>
-        <pc:sldMkLst>
-          <pc:docMk/>
-          <pc:sldMk cId="3048879607" sldId="266"/>
-        </pc:sldMkLst>
-        <pc:graphicFrameChg chg="mod modGraphic">
-          <ac:chgData name="Eardwulf Ulan" userId="S::18111@my.sanctamaria.school.nz::22607890-71d4-4bf2-b097-b426e6c19788" providerId="AD" clId="Web-{DC01E7D0-ECC4-24C5-E5BE-DE2A9FB64150}" dt="2023-05-17T10:19:10.085" v="32"/>
-          <ac:graphicFrameMkLst>
-            <pc:docMk/>
-            <pc:sldMk cId="3048879607" sldId="266"/>
-            <ac:graphicFrameMk id="79" creationId="{00000000-0000-0000-0000-000000000000}"/>
-          </ac:graphicFrameMkLst>
-        </pc:graphicFrameChg>
-        <pc:picChg chg="add mod">
-          <ac:chgData name="Eardwulf Ulan" userId="S::18111@my.sanctamaria.school.nz::22607890-71d4-4bf2-b097-b426e6c19788" providerId="AD" clId="Web-{DC01E7D0-ECC4-24C5-E5BE-DE2A9FB64150}" dt="2023-05-17T10:19:41.320" v="42" actId="1076"/>
-          <ac:picMkLst>
-            <pc:docMk/>
-            <pc:sldMk cId="3048879607" sldId="266"/>
-            <ac:picMk id="2" creationId="{9BDDC0F9-6AE4-4EE0-1C40-B0BA8AD63F9A}"/>
-          </ac:picMkLst>
-        </pc:picChg>
-        <pc:picChg chg="add mod">
-          <ac:chgData name="Eardwulf Ulan" userId="S::18111@my.sanctamaria.school.nz::22607890-71d4-4bf2-b097-b426e6c19788" providerId="AD" clId="Web-{DC01E7D0-ECC4-24C5-E5BE-DE2A9FB64150}" dt="2023-05-17T10:19:36.945" v="41" actId="1076"/>
-          <ac:picMkLst>
-            <pc:docMk/>
-            <pc:sldMk cId="3048879607" sldId="266"/>
-            <ac:picMk id="3" creationId="{C119085B-8D6B-D96A-A128-A62B3C6E9217}"/>
-          </ac:picMkLst>
-        </pc:picChg>
-      </pc:sldChg>
-      <pc:sldChg chg="addSp modSp">
-        <pc:chgData name="Eardwulf Ulan" userId="S::18111@my.sanctamaria.school.nz::22607890-71d4-4bf2-b097-b426e6c19788" providerId="AD" clId="Web-{DC01E7D0-ECC4-24C5-E5BE-DE2A9FB64150}" dt="2023-05-17T10:15:06.638" v="17" actId="14100"/>
-        <pc:sldMkLst>
-          <pc:docMk/>
-          <pc:sldMk cId="578345274" sldId="267"/>
-        </pc:sldMkLst>
-        <pc:spChg chg="mod">
-          <ac:chgData name="Eardwulf Ulan" userId="S::18111@my.sanctamaria.school.nz::22607890-71d4-4bf2-b097-b426e6c19788" providerId="AD" clId="Web-{DC01E7D0-ECC4-24C5-E5BE-DE2A9FB64150}" dt="2023-05-17T10:13:57.370" v="2" actId="20577"/>
-          <ac:spMkLst>
-            <pc:docMk/>
-            <pc:sldMk cId="578345274" sldId="267"/>
-            <ac:spMk id="73" creationId="{00000000-0000-0000-0000-000000000000}"/>
-          </ac:spMkLst>
-        </pc:spChg>
-        <pc:picChg chg="add mod">
-          <ac:chgData name="Eardwulf Ulan" userId="S::18111@my.sanctamaria.school.nz::22607890-71d4-4bf2-b097-b426e6c19788" providerId="AD" clId="Web-{DC01E7D0-ECC4-24C5-E5BE-DE2A9FB64150}" dt="2023-05-17T10:15:06.638" v="17" actId="14100"/>
-          <ac:picMkLst>
-            <pc:docMk/>
-            <pc:sldMk cId="578345274" sldId="267"/>
-            <ac:picMk id="2" creationId="{EA1F0CD1-3449-0507-DE35-16F879065109}"/>
-          </ac:picMkLst>
-        </pc:picChg>
-      </pc:sldChg>
-      <pc:sldChg chg="modSp">
-        <pc:chgData name="Eardwulf Ulan" userId="S::18111@my.sanctamaria.school.nz::22607890-71d4-4bf2-b097-b426e6c19788" providerId="AD" clId="Web-{DC01E7D0-ECC4-24C5-E5BE-DE2A9FB64150}" dt="2023-05-17T10:21:52.792" v="44" actId="20577"/>
-        <pc:sldMkLst>
-          <pc:docMk/>
-          <pc:sldMk cId="638340319" sldId="268"/>
-        </pc:sldMkLst>
-        <pc:spChg chg="mod">
-          <ac:chgData name="Eardwulf Ulan" userId="S::18111@my.sanctamaria.school.nz::22607890-71d4-4bf2-b097-b426e6c19788" providerId="AD" clId="Web-{DC01E7D0-ECC4-24C5-E5BE-DE2A9FB64150}" dt="2023-05-17T10:21:52.792" v="44" actId="20577"/>
-          <ac:spMkLst>
-            <pc:docMk/>
-            <pc:sldMk cId="638340319" sldId="268"/>
-            <ac:spMk id="73" creationId="{00000000-0000-0000-0000-000000000000}"/>
-          </ac:spMkLst>
-        </pc:spChg>
-      </pc:sldChg>
-      <pc:sldChg chg="add ord replId">
-        <pc:chgData name="Eardwulf Ulan" userId="S::18111@my.sanctamaria.school.nz::22607890-71d4-4bf2-b097-b426e6c19788" providerId="AD" clId="Web-{DC01E7D0-ECC4-24C5-E5BE-DE2A9FB64150}" dt="2023-05-17T10:15:19.393" v="20"/>
-        <pc:sldMkLst>
-          <pc:docMk/>
-          <pc:sldMk cId="2125486748" sldId="270"/>
-        </pc:sldMkLst>
-      </pc:sldChg>
-      <pc:sldChg chg="add replId">
-        <pc:chgData name="Eardwulf Ulan" userId="S::18111@my.sanctamaria.school.nz::22607890-71d4-4bf2-b097-b426e6c19788" providerId="AD" clId="Web-{DC01E7D0-ECC4-24C5-E5BE-DE2A9FB64150}" dt="2023-05-17T10:15:17.435" v="19"/>
-        <pc:sldMkLst>
-          <pc:docMk/>
-          <pc:sldMk cId="1744829088" sldId="271"/>
-        </pc:sldMkLst>
-      </pc:sldChg>
-    </pc:docChg>
-  </pc:docChgLst>
-  <pc:docChgLst>
     <pc:chgData name="Eardwulf Ulan" userId="S::18111@my.sanctamaria.school.nz::22607890-71d4-4bf2-b097-b426e6c19788" providerId="AD" clId="Web-{EEA164D0-AAA0-D66E-99E2-4DAFD6A87FD6}"/>
     <pc:docChg chg="addSld modSld sldOrd modSection">
-      <pc:chgData name="Eardwulf Ulan" userId="S::18111@my.sanctamaria.school.nz::22607890-71d4-4bf2-b097-b426e6c19788" providerId="AD" clId="Web-{EEA164D0-AAA0-D66E-99E2-4DAFD6A87FD6}" dt="2023-05-18T09:29:03.585" v="386"/>
+      <pc:chgData name="Eardwulf Ulan" userId="S::18111@my.sanctamaria.school.nz::22607890-71d4-4bf2-b097-b426e6c19788" providerId="AD" clId="Web-{EEA164D0-AAA0-D66E-99E2-4DAFD6A87FD6}" dt="2023-05-18T10:08:26.858" v="393" actId="1076"/>
       <pc:docMkLst>
         <pc:docMk/>
       </pc:docMkLst>
@@ -792,8 +606,8 @@
           </ac:picMkLst>
         </pc:picChg>
       </pc:sldChg>
-      <pc:sldChg chg="modSp add ord replId">
-        <pc:chgData name="Eardwulf Ulan" userId="S::18111@my.sanctamaria.school.nz::22607890-71d4-4bf2-b097-b426e6c19788" providerId="AD" clId="Web-{EEA164D0-AAA0-D66E-99E2-4DAFD6A87FD6}" dt="2023-05-18T09:20:20.915" v="290" actId="20577"/>
+      <pc:sldChg chg="addSp modSp add ord replId">
+        <pc:chgData name="Eardwulf Ulan" userId="S::18111@my.sanctamaria.school.nz::22607890-71d4-4bf2-b097-b426e6c19788" providerId="AD" clId="Web-{EEA164D0-AAA0-D66E-99E2-4DAFD6A87FD6}" dt="2023-05-18T10:08:26.858" v="393" actId="1076"/>
         <pc:sldMkLst>
           <pc:docMk/>
           <pc:sldMk cId="3902562159" sldId="276"/>
@@ -806,6 +620,14 @@
             <ac:spMk id="73" creationId="{00000000-0000-0000-0000-000000000000}"/>
           </ac:spMkLst>
         </pc:spChg>
+        <pc:picChg chg="add mod">
+          <ac:chgData name="Eardwulf Ulan" userId="S::18111@my.sanctamaria.school.nz::22607890-71d4-4bf2-b097-b426e6c19788" providerId="AD" clId="Web-{EEA164D0-AAA0-D66E-99E2-4DAFD6A87FD6}" dt="2023-05-18T10:08:26.858" v="393" actId="1076"/>
+          <ac:picMkLst>
+            <pc:docMk/>
+            <pc:sldMk cId="3902562159" sldId="276"/>
+            <ac:picMk id="2" creationId="{1710DD43-507B-6475-1427-66648A62A501}"/>
+          </ac:picMkLst>
+        </pc:picChg>
       </pc:sldChg>
       <pc:sldChg chg="addSp modSp add replId">
         <pc:chgData name="Eardwulf Ulan" userId="S::18111@my.sanctamaria.school.nz::22607890-71d4-4bf2-b097-b426e6c19788" providerId="AD" clId="Web-{EEA164D0-AAA0-D66E-99E2-4DAFD6A87FD6}" dt="2023-05-18T09:28:52.491" v="381" actId="1076"/>
@@ -897,6 +719,192 @@
           <pc:docMk/>
           <pc:sldMk cId="3748886745" sldId="281"/>
         </pc:sldMkLst>
+      </pc:sldChg>
+    </pc:docChg>
+  </pc:docChgLst>
+  <pc:docChgLst>
+    <pc:chgData name="Eardwulf Ulan" userId="S::18111@my.sanctamaria.school.nz::22607890-71d4-4bf2-b097-b426e6c19788" providerId="AD" clId="Web-{DC01E7D0-ECC4-24C5-E5BE-DE2A9FB64150}"/>
+    <pc:docChg chg="addSld modSld sldOrd modSection">
+      <pc:chgData name="Eardwulf Ulan" userId="S::18111@my.sanctamaria.school.nz::22607890-71d4-4bf2-b097-b426e6c19788" providerId="AD" clId="Web-{DC01E7D0-ECC4-24C5-E5BE-DE2A9FB64150}" dt="2023-05-17T10:21:52.792" v="44" actId="20577"/>
+      <pc:docMkLst>
+        <pc:docMk/>
+      </pc:docMkLst>
+      <pc:sldChg chg="addSp modSp">
+        <pc:chgData name="Eardwulf Ulan" userId="S::18111@my.sanctamaria.school.nz::22607890-71d4-4bf2-b097-b426e6c19788" providerId="AD" clId="Web-{DC01E7D0-ECC4-24C5-E5BE-DE2A9FB64150}" dt="2023-05-17T10:19:41.320" v="42" actId="1076"/>
+        <pc:sldMkLst>
+          <pc:docMk/>
+          <pc:sldMk cId="3048879607" sldId="266"/>
+        </pc:sldMkLst>
+        <pc:graphicFrameChg chg="mod modGraphic">
+          <ac:chgData name="Eardwulf Ulan" userId="S::18111@my.sanctamaria.school.nz::22607890-71d4-4bf2-b097-b426e6c19788" providerId="AD" clId="Web-{DC01E7D0-ECC4-24C5-E5BE-DE2A9FB64150}" dt="2023-05-17T10:19:10.085" v="32"/>
+          <ac:graphicFrameMkLst>
+            <pc:docMk/>
+            <pc:sldMk cId="3048879607" sldId="266"/>
+            <ac:graphicFrameMk id="79" creationId="{00000000-0000-0000-0000-000000000000}"/>
+          </ac:graphicFrameMkLst>
+        </pc:graphicFrameChg>
+        <pc:picChg chg="add mod">
+          <ac:chgData name="Eardwulf Ulan" userId="S::18111@my.sanctamaria.school.nz::22607890-71d4-4bf2-b097-b426e6c19788" providerId="AD" clId="Web-{DC01E7D0-ECC4-24C5-E5BE-DE2A9FB64150}" dt="2023-05-17T10:19:41.320" v="42" actId="1076"/>
+          <ac:picMkLst>
+            <pc:docMk/>
+            <pc:sldMk cId="3048879607" sldId="266"/>
+            <ac:picMk id="2" creationId="{9BDDC0F9-6AE4-4EE0-1C40-B0BA8AD63F9A}"/>
+          </ac:picMkLst>
+        </pc:picChg>
+        <pc:picChg chg="add mod">
+          <ac:chgData name="Eardwulf Ulan" userId="S::18111@my.sanctamaria.school.nz::22607890-71d4-4bf2-b097-b426e6c19788" providerId="AD" clId="Web-{DC01E7D0-ECC4-24C5-E5BE-DE2A9FB64150}" dt="2023-05-17T10:19:36.945" v="41" actId="1076"/>
+          <ac:picMkLst>
+            <pc:docMk/>
+            <pc:sldMk cId="3048879607" sldId="266"/>
+            <ac:picMk id="3" creationId="{C119085B-8D6B-D96A-A128-A62B3C6E9217}"/>
+          </ac:picMkLst>
+        </pc:picChg>
+      </pc:sldChg>
+      <pc:sldChg chg="addSp modSp">
+        <pc:chgData name="Eardwulf Ulan" userId="S::18111@my.sanctamaria.school.nz::22607890-71d4-4bf2-b097-b426e6c19788" providerId="AD" clId="Web-{DC01E7D0-ECC4-24C5-E5BE-DE2A9FB64150}" dt="2023-05-17T10:15:06.638" v="17" actId="14100"/>
+        <pc:sldMkLst>
+          <pc:docMk/>
+          <pc:sldMk cId="578345274" sldId="267"/>
+        </pc:sldMkLst>
+        <pc:spChg chg="mod">
+          <ac:chgData name="Eardwulf Ulan" userId="S::18111@my.sanctamaria.school.nz::22607890-71d4-4bf2-b097-b426e6c19788" providerId="AD" clId="Web-{DC01E7D0-ECC4-24C5-E5BE-DE2A9FB64150}" dt="2023-05-17T10:13:57.370" v="2" actId="20577"/>
+          <ac:spMkLst>
+            <pc:docMk/>
+            <pc:sldMk cId="578345274" sldId="267"/>
+            <ac:spMk id="73" creationId="{00000000-0000-0000-0000-000000000000}"/>
+          </ac:spMkLst>
+        </pc:spChg>
+        <pc:picChg chg="add mod">
+          <ac:chgData name="Eardwulf Ulan" userId="S::18111@my.sanctamaria.school.nz::22607890-71d4-4bf2-b097-b426e6c19788" providerId="AD" clId="Web-{DC01E7D0-ECC4-24C5-E5BE-DE2A9FB64150}" dt="2023-05-17T10:15:06.638" v="17" actId="14100"/>
+          <ac:picMkLst>
+            <pc:docMk/>
+            <pc:sldMk cId="578345274" sldId="267"/>
+            <ac:picMk id="2" creationId="{EA1F0CD1-3449-0507-DE35-16F879065109}"/>
+          </ac:picMkLst>
+        </pc:picChg>
+      </pc:sldChg>
+      <pc:sldChg chg="modSp">
+        <pc:chgData name="Eardwulf Ulan" userId="S::18111@my.sanctamaria.school.nz::22607890-71d4-4bf2-b097-b426e6c19788" providerId="AD" clId="Web-{DC01E7D0-ECC4-24C5-E5BE-DE2A9FB64150}" dt="2023-05-17T10:21:52.792" v="44" actId="20577"/>
+        <pc:sldMkLst>
+          <pc:docMk/>
+          <pc:sldMk cId="638340319" sldId="268"/>
+        </pc:sldMkLst>
+        <pc:spChg chg="mod">
+          <ac:chgData name="Eardwulf Ulan" userId="S::18111@my.sanctamaria.school.nz::22607890-71d4-4bf2-b097-b426e6c19788" providerId="AD" clId="Web-{DC01E7D0-ECC4-24C5-E5BE-DE2A9FB64150}" dt="2023-05-17T10:21:52.792" v="44" actId="20577"/>
+          <ac:spMkLst>
+            <pc:docMk/>
+            <pc:sldMk cId="638340319" sldId="268"/>
+            <ac:spMk id="73" creationId="{00000000-0000-0000-0000-000000000000}"/>
+          </ac:spMkLst>
+        </pc:spChg>
+      </pc:sldChg>
+      <pc:sldChg chg="add ord replId">
+        <pc:chgData name="Eardwulf Ulan" userId="S::18111@my.sanctamaria.school.nz::22607890-71d4-4bf2-b097-b426e6c19788" providerId="AD" clId="Web-{DC01E7D0-ECC4-24C5-E5BE-DE2A9FB64150}" dt="2023-05-17T10:15:19.393" v="20"/>
+        <pc:sldMkLst>
+          <pc:docMk/>
+          <pc:sldMk cId="2125486748" sldId="270"/>
+        </pc:sldMkLst>
+      </pc:sldChg>
+      <pc:sldChg chg="add replId">
+        <pc:chgData name="Eardwulf Ulan" userId="S::18111@my.sanctamaria.school.nz::22607890-71d4-4bf2-b097-b426e6c19788" providerId="AD" clId="Web-{DC01E7D0-ECC4-24C5-E5BE-DE2A9FB64150}" dt="2023-05-17T10:15:17.435" v="19"/>
+        <pc:sldMkLst>
+          <pc:docMk/>
+          <pc:sldMk cId="1744829088" sldId="271"/>
+        </pc:sldMkLst>
+      </pc:sldChg>
+    </pc:docChg>
+  </pc:docChgLst>
+  <pc:docChgLst>
+    <pc:chgData name="Eardwulf Ulan" userId="S::18111@my.sanctamaria.school.nz::22607890-71d4-4bf2-b097-b426e6c19788" providerId="AD" clId="Web-{597EAEB2-F50F-160F-61EB-A2437C088CEE}"/>
+    <pc:docChg chg="modSld">
+      <pc:chgData name="Eardwulf Ulan" userId="S::18111@my.sanctamaria.school.nz::22607890-71d4-4bf2-b097-b426e6c19788" providerId="AD" clId="Web-{597EAEB2-F50F-160F-61EB-A2437C088CEE}" dt="2023-05-18T00:12:17.453" v="104"/>
+      <pc:docMkLst>
+        <pc:docMk/>
+      </pc:docMkLst>
+      <pc:sldChg chg="modSp">
+        <pc:chgData name="Eardwulf Ulan" userId="S::18111@my.sanctamaria.school.nz::22607890-71d4-4bf2-b097-b426e6c19788" providerId="AD" clId="Web-{597EAEB2-F50F-160F-61EB-A2437C088CEE}" dt="2023-05-18T00:12:00.686" v="90"/>
+        <pc:sldMkLst>
+          <pc:docMk/>
+          <pc:sldMk cId="3048879607" sldId="266"/>
+        </pc:sldMkLst>
+        <pc:graphicFrameChg chg="mod modGraphic">
+          <ac:chgData name="Eardwulf Ulan" userId="S::18111@my.sanctamaria.school.nz::22607890-71d4-4bf2-b097-b426e6c19788" providerId="AD" clId="Web-{597EAEB2-F50F-160F-61EB-A2437C088CEE}" dt="2023-05-18T00:12:00.686" v="90"/>
+          <ac:graphicFrameMkLst>
+            <pc:docMk/>
+            <pc:sldMk cId="3048879607" sldId="266"/>
+            <ac:graphicFrameMk id="79" creationId="{00000000-0000-0000-0000-000000000000}"/>
+          </ac:graphicFrameMkLst>
+        </pc:graphicFrameChg>
+      </pc:sldChg>
+      <pc:sldChg chg="modSp">
+        <pc:chgData name="Eardwulf Ulan" userId="S::18111@my.sanctamaria.school.nz::22607890-71d4-4bf2-b097-b426e6c19788" providerId="AD" clId="Web-{597EAEB2-F50F-160F-61EB-A2437C088CEE}" dt="2023-05-18T00:12:10.015" v="92"/>
+        <pc:sldMkLst>
+          <pc:docMk/>
+          <pc:sldMk cId="1713692142" sldId="269"/>
+        </pc:sldMkLst>
+        <pc:graphicFrameChg chg="mod modGraphic">
+          <ac:chgData name="Eardwulf Ulan" userId="S::18111@my.sanctamaria.school.nz::22607890-71d4-4bf2-b097-b426e6c19788" providerId="AD" clId="Web-{597EAEB2-F50F-160F-61EB-A2437C088CEE}" dt="2023-05-18T00:12:10.015" v="92"/>
+          <ac:graphicFrameMkLst>
+            <pc:docMk/>
+            <pc:sldMk cId="1713692142" sldId="269"/>
+            <ac:graphicFrameMk id="79" creationId="{00000000-0000-0000-0000-000000000000}"/>
+          </ac:graphicFrameMkLst>
+        </pc:graphicFrameChg>
+      </pc:sldChg>
+      <pc:sldChg chg="addSp modSp">
+        <pc:chgData name="Eardwulf Ulan" userId="S::18111@my.sanctamaria.school.nz::22607890-71d4-4bf2-b097-b426e6c19788" providerId="AD" clId="Web-{597EAEB2-F50F-160F-61EB-A2437C088CEE}" dt="2023-05-18T00:12:17.453" v="104"/>
+        <pc:sldMkLst>
+          <pc:docMk/>
+          <pc:sldMk cId="1744829088" sldId="271"/>
+        </pc:sldMkLst>
+        <pc:spChg chg="add mod">
+          <ac:chgData name="Eardwulf Ulan" userId="S::18111@my.sanctamaria.school.nz::22607890-71d4-4bf2-b097-b426e6c19788" providerId="AD" clId="Web-{597EAEB2-F50F-160F-61EB-A2437C088CEE}" dt="2023-05-18T00:09:35.291" v="27" actId="1076"/>
+          <ac:spMkLst>
+            <pc:docMk/>
+            <pc:sldMk cId="1744829088" sldId="271"/>
+            <ac:spMk id="5" creationId="{90F5EE74-B6EB-BA14-5B25-0D2113AFF263}"/>
+          </ac:spMkLst>
+        </pc:spChg>
+        <pc:spChg chg="add mod">
+          <ac:chgData name="Eardwulf Ulan" userId="S::18111@my.sanctamaria.school.nz::22607890-71d4-4bf2-b097-b426e6c19788" providerId="AD" clId="Web-{597EAEB2-F50F-160F-61EB-A2437C088CEE}" dt="2023-05-18T00:09:53.760" v="35" actId="14100"/>
+          <ac:spMkLst>
+            <pc:docMk/>
+            <pc:sldMk cId="1744829088" sldId="271"/>
+            <ac:spMk id="6" creationId="{E3F9A34D-F561-BE90-58AE-A0B824329799}"/>
+          </ac:spMkLst>
+        </pc:spChg>
+        <pc:graphicFrameChg chg="mod modGraphic">
+          <ac:chgData name="Eardwulf Ulan" userId="S::18111@my.sanctamaria.school.nz::22607890-71d4-4bf2-b097-b426e6c19788" providerId="AD" clId="Web-{597EAEB2-F50F-160F-61EB-A2437C088CEE}" dt="2023-05-18T00:12:17.453" v="104"/>
+          <ac:graphicFrameMkLst>
+            <pc:docMk/>
+            <pc:sldMk cId="1744829088" sldId="271"/>
+            <ac:graphicFrameMk id="79" creationId="{00000000-0000-0000-0000-000000000000}"/>
+          </ac:graphicFrameMkLst>
+        </pc:graphicFrameChg>
+        <pc:picChg chg="mod">
+          <ac:chgData name="Eardwulf Ulan" userId="S::18111@my.sanctamaria.school.nz::22607890-71d4-4bf2-b097-b426e6c19788" providerId="AD" clId="Web-{597EAEB2-F50F-160F-61EB-A2437C088CEE}" dt="2023-05-18T00:08:38.585" v="8" actId="1076"/>
+          <ac:picMkLst>
+            <pc:docMk/>
+            <pc:sldMk cId="1744829088" sldId="271"/>
+            <ac:picMk id="2" creationId="{B56E88FD-1437-5CE3-DB07-3D1049B39886}"/>
+          </ac:picMkLst>
+        </pc:picChg>
+        <pc:picChg chg="mod">
+          <ac:chgData name="Eardwulf Ulan" userId="S::18111@my.sanctamaria.school.nz::22607890-71d4-4bf2-b097-b426e6c19788" providerId="AD" clId="Web-{597EAEB2-F50F-160F-61EB-A2437C088CEE}" dt="2023-05-18T00:08:25.522" v="4" actId="1076"/>
+          <ac:picMkLst>
+            <pc:docMk/>
+            <pc:sldMk cId="1744829088" sldId="271"/>
+            <ac:picMk id="3" creationId="{C1ABCF39-DA20-BF54-AF3D-5898B138441A}"/>
+          </ac:picMkLst>
+        </pc:picChg>
+        <pc:picChg chg="add mod">
+          <ac:chgData name="Eardwulf Ulan" userId="S::18111@my.sanctamaria.school.nz::22607890-71d4-4bf2-b097-b426e6c19788" providerId="AD" clId="Web-{597EAEB2-F50F-160F-61EB-A2437C088CEE}" dt="2023-05-18T00:08:36.523" v="7" actId="1076"/>
+          <ac:picMkLst>
+            <pc:docMk/>
+            <pc:sldMk cId="1744829088" sldId="271"/>
+            <ac:picMk id="4" creationId="{3BC4EC35-42FC-1134-F922-409FA29628BB}"/>
+          </ac:picMkLst>
+        </pc:picChg>
       </pc:sldChg>
     </pc:docChg>
   </pc:docChgLst>
@@ -12627,6 +12635,36 @@
           </a:p>
         </p:txBody>
       </p:sp>
+      <p:pic>
+        <p:nvPicPr>
+          <p:cNvPr id="2" name="Picture 2" descr="Graphical user interface, application&#10;&#10;Description automatically generated">
+            <a:extLst>
+              <a:ext uri="{FF2B5EF4-FFF2-40B4-BE49-F238E27FC236}">
+                <a16:creationId xmlns:a16="http://schemas.microsoft.com/office/drawing/2014/main" id="{1710DD43-507B-6475-1427-66648A62A501}"/>
+              </a:ext>
+            </a:extLst>
+          </p:cNvPr>
+          <p:cNvPicPr>
+            <a:picLocks noChangeAspect="1"/>
+          </p:cNvPicPr>
+          <p:nvPr/>
+        </p:nvPicPr>
+        <p:blipFill>
+          <a:blip r:embed="rId3"/>
+          <a:stretch>
+            <a:fillRect/>
+          </a:stretch>
+        </p:blipFill>
+        <p:spPr>
+          <a:xfrm>
+            <a:off x="2531327" y="1071048"/>
+            <a:ext cx="4081346" cy="3970165"/>
+          </a:xfrm>
+          <a:prstGeom prst="rect">
+            <a:avLst/>
+          </a:prstGeom>
+        </p:spPr>
+      </p:pic>
     </p:spTree>
     <p:extLst>
       <p:ext uri="{BB962C8B-B14F-4D97-AF65-F5344CB8AC3E}">
@@ -15876,14 +15914,6 @@
 </file>
 
 <file path=customXml/item1.xml><?xml version="1.0" encoding="utf-8"?>
-<p:properties xmlns:p="http://schemas.microsoft.com/office/2006/metadata/properties" xmlns:xsi="http://www.w3.org/2001/XMLSchema-instance" xmlns:pc="http://schemas.microsoft.com/office/infopath/2007/PartnerControls">
-  <documentManagement>
-    <_activity xmlns="2b310483-19ef-4f1a-8666-427aba7c04f4" xsi:nil="true"/>
-  </documentManagement>
-</p:properties>
-</file>
-
-<file path=customXml/item2.xml><?xml version="1.0" encoding="utf-8"?>
 <ct:contentTypeSchema xmlns:ct="http://schemas.microsoft.com/office/2006/metadata/contentType" xmlns:ma="http://schemas.microsoft.com/office/2006/metadata/properties/metaAttributes" ct:_="" ma:_="" ma:contentTypeName="Document" ma:contentTypeID="0x010100024DC8DFD6C93447A9C11B519434E451" ma:contentTypeVersion="13" ma:contentTypeDescription="Create a new document." ma:contentTypeScope="" ma:versionID="d78c653d52c678877916f644d9003a4b">
   <xsd:schema xmlns:xsd="http://www.w3.org/2001/XMLSchema" xmlns:xs="http://www.w3.org/2001/XMLSchema" xmlns:p="http://schemas.microsoft.com/office/2006/metadata/properties" xmlns:ns3="2b310483-19ef-4f1a-8666-427aba7c04f4" xmlns:ns4="d316a0db-0591-438e-8093-79f3efde1904" targetNamespace="http://schemas.microsoft.com/office/2006/metadata/properties" ma:root="true" ma:fieldsID="b51e56a0bc6a455bf4c7a7bc9489865b" ns3:_="" ns4:_="">
     <xsd:import namespace="2b310483-19ef-4f1a-8666-427aba7c04f4"/>
@@ -16106,6 +16136,14 @@
 </ct:contentTypeSchema>
 </file>
 
+<file path=customXml/item2.xml><?xml version="1.0" encoding="utf-8"?>
+<p:properties xmlns:p="http://schemas.microsoft.com/office/2006/metadata/properties" xmlns:xsi="http://www.w3.org/2001/XMLSchema-instance" xmlns:pc="http://schemas.microsoft.com/office/infopath/2007/PartnerControls">
+  <documentManagement>
+    <_activity xmlns="2b310483-19ef-4f1a-8666-427aba7c04f4" xsi:nil="true"/>
+  </documentManagement>
+</p:properties>
+</file>
+
 <file path=customXml/item3.xml><?xml version="1.0" encoding="utf-8"?>
 <?mso-contentType ?>
 <FormTemplates xmlns="http://schemas.microsoft.com/sharepoint/v3/contenttype/forms">
@@ -16116,23 +16154,6 @@
 </file>
 
 <file path=customXml/itemProps1.xml><?xml version="1.0" encoding="utf-8"?>
-<ds:datastoreItem xmlns:ds="http://schemas.openxmlformats.org/officeDocument/2006/customXml" ds:itemID="{68DCCC3C-0DB3-455E-8505-0D93175A8009}">
-  <ds:schemaRefs>
-    <ds:schemaRef ds:uri="2b310483-19ef-4f1a-8666-427aba7c04f4"/>
-    <ds:schemaRef ds:uri="d316a0db-0591-438e-8093-79f3efde1904"/>
-    <ds:schemaRef ds:uri="http://purl.org/dc/dcmitype/"/>
-    <ds:schemaRef ds:uri="http://purl.org/dc/elements/1.1/"/>
-    <ds:schemaRef ds:uri="http://purl.org/dc/terms/"/>
-    <ds:schemaRef ds:uri="http://schemas.microsoft.com/office/2006/documentManagement/types"/>
-    <ds:schemaRef ds:uri="http://schemas.microsoft.com/office/2006/metadata/properties"/>
-    <ds:schemaRef ds:uri="http://schemas.microsoft.com/office/infopath/2007/PartnerControls"/>
-    <ds:schemaRef ds:uri="http://schemas.openxmlformats.org/package/2006/metadata/core-properties"/>
-    <ds:schemaRef ds:uri="http://www.w3.org/XML/1998/namespace"/>
-  </ds:schemaRefs>
-</ds:datastoreItem>
-</file>
-
-<file path=customXml/itemProps2.xml><?xml version="1.0" encoding="utf-8"?>
 <ds:datastoreItem xmlns:ds="http://schemas.openxmlformats.org/officeDocument/2006/customXml" ds:itemID="{0E32B551-2E7E-4680-9EB8-D0B1C8724946}">
   <ds:schemaRefs>
     <ds:schemaRef ds:uri="2b310483-19ef-4f1a-8666-427aba7c04f4"/>
@@ -16151,6 +16172,23 @@
 </ds:datastoreItem>
 </file>
 
+<file path=customXml/itemProps2.xml><?xml version="1.0" encoding="utf-8"?>
+<ds:datastoreItem xmlns:ds="http://schemas.openxmlformats.org/officeDocument/2006/customXml" ds:itemID="{68DCCC3C-0DB3-455E-8505-0D93175A8009}">
+  <ds:schemaRefs>
+    <ds:schemaRef ds:uri="2b310483-19ef-4f1a-8666-427aba7c04f4"/>
+    <ds:schemaRef ds:uri="d316a0db-0591-438e-8093-79f3efde1904"/>
+    <ds:schemaRef ds:uri="http://purl.org/dc/dcmitype/"/>
+    <ds:schemaRef ds:uri="http://purl.org/dc/elements/1.1/"/>
+    <ds:schemaRef ds:uri="http://purl.org/dc/terms/"/>
+    <ds:schemaRef ds:uri="http://schemas.microsoft.com/office/2006/documentManagement/types"/>
+    <ds:schemaRef ds:uri="http://schemas.microsoft.com/office/2006/metadata/properties"/>
+    <ds:schemaRef ds:uri="http://schemas.microsoft.com/office/infopath/2007/PartnerControls"/>
+    <ds:schemaRef ds:uri="http://schemas.openxmlformats.org/package/2006/metadata/core-properties"/>
+    <ds:schemaRef ds:uri="http://www.w3.org/XML/1998/namespace"/>
+  </ds:schemaRefs>
+</ds:datastoreItem>
+</file>
+
 <file path=customXml/itemProps3.xml><?xml version="1.0" encoding="utf-8"?>
 <ds:datastoreItem xmlns:ds="http://schemas.openxmlformats.org/officeDocument/2006/customXml" ds:itemID="{9B757C8B-782F-4BDF-9F90-4601D3A0F6AF}">
   <ds:schemaRefs>

</xml_diff>